<commit_message>
PPT and Report - w/o Sentiment Analysis
</commit_message>
<xml_diff>
--- a/presentation/Mid_Term.pptx
+++ b/presentation/Mid_Term.pptx
@@ -5,7 +5,7 @@
     <p:sldMasterId id="2147483659" r:id="rId1"/>
   </p:sldMasterIdLst>
   <p:notesMasterIdLst>
-    <p:notesMasterId r:id="rId22"/>
+    <p:notesMasterId r:id="rId23"/>
   </p:notesMasterIdLst>
   <p:sldIdLst>
     <p:sldId id="256" r:id="rId2"/>
@@ -17,41 +17,42 @@
     <p:sldId id="262" r:id="rId8"/>
     <p:sldId id="263" r:id="rId9"/>
     <p:sldId id="264" r:id="rId10"/>
-    <p:sldId id="265" r:id="rId11"/>
-    <p:sldId id="266" r:id="rId12"/>
-    <p:sldId id="267" r:id="rId13"/>
-    <p:sldId id="268" r:id="rId14"/>
-    <p:sldId id="269" r:id="rId15"/>
-    <p:sldId id="270" r:id="rId16"/>
-    <p:sldId id="271" r:id="rId17"/>
-    <p:sldId id="272" r:id="rId18"/>
-    <p:sldId id="273" r:id="rId19"/>
-    <p:sldId id="274" r:id="rId20"/>
-    <p:sldId id="275" r:id="rId21"/>
+    <p:sldId id="276" r:id="rId11"/>
+    <p:sldId id="265" r:id="rId12"/>
+    <p:sldId id="266" r:id="rId13"/>
+    <p:sldId id="267" r:id="rId14"/>
+    <p:sldId id="268" r:id="rId15"/>
+    <p:sldId id="269" r:id="rId16"/>
+    <p:sldId id="270" r:id="rId17"/>
+    <p:sldId id="271" r:id="rId18"/>
+    <p:sldId id="272" r:id="rId19"/>
+    <p:sldId id="273" r:id="rId20"/>
+    <p:sldId id="274" r:id="rId21"/>
+    <p:sldId id="275" r:id="rId22"/>
   </p:sldIdLst>
   <p:sldSz cx="9144000" cy="5143500" type="screen16x9"/>
   <p:notesSz cx="6858000" cy="9144000"/>
   <p:embeddedFontLst>
     <p:embeddedFont>
       <p:font typeface="Raleway" panose="020B0604020202020204" charset="0"/>
-      <p:regular r:id="rId23"/>
-      <p:bold r:id="rId24"/>
-      <p:italic r:id="rId25"/>
-      <p:boldItalic r:id="rId26"/>
+      <p:regular r:id="rId24"/>
+      <p:bold r:id="rId25"/>
+      <p:italic r:id="rId26"/>
+      <p:boldItalic r:id="rId27"/>
+    </p:embeddedFont>
+    <p:embeddedFont>
+      <p:font typeface="Roboto" panose="020B0604020202020204" charset="0"/>
+      <p:regular r:id="rId28"/>
+      <p:bold r:id="rId29"/>
+      <p:italic r:id="rId30"/>
+      <p:boldItalic r:id="rId31"/>
     </p:embeddedFont>
     <p:embeddedFont>
       <p:font typeface="Lato" panose="020B0604020202020204" charset="0"/>
-      <p:regular r:id="rId27"/>
-      <p:bold r:id="rId28"/>
-      <p:italic r:id="rId29"/>
-      <p:boldItalic r:id="rId30"/>
-    </p:embeddedFont>
-    <p:embeddedFont>
-      <p:font typeface="Roboto" panose="020B0604020202020204" charset="0"/>
-      <p:regular r:id="rId31"/>
-      <p:bold r:id="rId32"/>
-      <p:italic r:id="rId33"/>
-      <p:boldItalic r:id="rId34"/>
+      <p:regular r:id="rId32"/>
+      <p:bold r:id="rId33"/>
+      <p:italic r:id="rId34"/>
+      <p:boldItalic r:id="rId35"/>
     </p:embeddedFont>
   </p:embeddedFontLst>
   <p:defaultTextStyle>
@@ -256,6 +257,11 @@
       </a:defRPr>
     </a:lvl9pPr>
   </p:defaultTextStyle>
+  <p:extLst>
+    <p:ext uri="{EFAFB233-063F-42B5-8137-9DF3F51BA10A}">
+      <p15:sldGuideLst xmlns:p15="http://schemas.microsoft.com/office/powerpoint/2012/main"/>
+    </p:ext>
+  </p:extLst>
 </p:presentation>
 </file>
 
@@ -641,7 +647,7 @@
   <p:cSld>
     <p:spTree>
       <p:nvGrpSpPr>
-        <p:cNvPr id="1" name="Shape 137"/>
+        <p:cNvPr id="1" name="Shape 131"/>
         <p:cNvGrpSpPr/>
         <p:nvPr/>
       </p:nvGrpSpPr>
@@ -655,7 +661,7 @@
       </p:grpSpPr>
       <p:sp>
         <p:nvSpPr>
-          <p:cNvPr id="138" name="Shape 138"/>
+          <p:cNvPr id="132" name="Shape 132"/>
           <p:cNvSpPr>
             <a:spLocks noGrp="1" noRot="1" noChangeAspect="1"/>
           </p:cNvSpPr>
@@ -696,7 +702,7 @@
       </p:sp>
       <p:sp>
         <p:nvSpPr>
-          <p:cNvPr id="139" name="Shape 139"/>
+          <p:cNvPr id="133" name="Shape 133"/>
           <p:cNvSpPr txBox="1">
             <a:spLocks noGrp="1"/>
           </p:cNvSpPr>
@@ -732,7 +738,7 @@
     </p:spTree>
     <p:extLst>
       <p:ext uri="{BB962C8B-B14F-4D97-AF65-F5344CB8AC3E}">
-        <p14:creationId xmlns:p14="http://schemas.microsoft.com/office/powerpoint/2010/main" val="1274207966"/>
+        <p14:creationId xmlns:p14="http://schemas.microsoft.com/office/powerpoint/2010/main" val="1399597897"/>
       </p:ext>
     </p:extLst>
   </p:cSld>
@@ -747,7 +753,7 @@
   <p:cSld>
     <p:spTree>
       <p:nvGrpSpPr>
-        <p:cNvPr id="1" name="Shape 143"/>
+        <p:cNvPr id="1" name="Shape 137"/>
         <p:cNvGrpSpPr/>
         <p:nvPr/>
       </p:nvGrpSpPr>
@@ -761,7 +767,7 @@
       </p:grpSpPr>
       <p:sp>
         <p:nvSpPr>
-          <p:cNvPr id="144" name="Shape 144"/>
+          <p:cNvPr id="138" name="Shape 138"/>
           <p:cNvSpPr>
             <a:spLocks noGrp="1" noRot="1" noChangeAspect="1"/>
           </p:cNvSpPr>
@@ -802,7 +808,7 @@
       </p:sp>
       <p:sp>
         <p:nvSpPr>
-          <p:cNvPr id="145" name="Shape 145"/>
+          <p:cNvPr id="139" name="Shape 139"/>
           <p:cNvSpPr txBox="1">
             <a:spLocks noGrp="1"/>
           </p:cNvSpPr>
@@ -825,7 +831,7 @@
           </a:bodyPr>
           <a:lstStyle/>
           <a:p>
-            <a:pPr lvl="0" rtl="0">
+            <a:pPr lvl="0">
               <a:spcBef>
                 <a:spcPts val="0"/>
               </a:spcBef>
@@ -838,7 +844,7 @@
     </p:spTree>
     <p:extLst>
       <p:ext uri="{BB962C8B-B14F-4D97-AF65-F5344CB8AC3E}">
-        <p14:creationId xmlns:p14="http://schemas.microsoft.com/office/powerpoint/2010/main" val="2234372423"/>
+        <p14:creationId xmlns:p14="http://schemas.microsoft.com/office/powerpoint/2010/main" val="1274207966"/>
       </p:ext>
     </p:extLst>
   </p:cSld>
@@ -853,7 +859,7 @@
   <p:cSld>
     <p:spTree>
       <p:nvGrpSpPr>
-        <p:cNvPr id="1" name="Shape 152"/>
+        <p:cNvPr id="1" name="Shape 143"/>
         <p:cNvGrpSpPr/>
         <p:nvPr/>
       </p:nvGrpSpPr>
@@ -867,7 +873,7 @@
       </p:grpSpPr>
       <p:sp>
         <p:nvSpPr>
-          <p:cNvPr id="153" name="Shape 153"/>
+          <p:cNvPr id="144" name="Shape 144"/>
           <p:cNvSpPr>
             <a:spLocks noGrp="1" noRot="1" noChangeAspect="1"/>
           </p:cNvSpPr>
@@ -908,7 +914,7 @@
       </p:sp>
       <p:sp>
         <p:nvSpPr>
-          <p:cNvPr id="154" name="Shape 154"/>
+          <p:cNvPr id="145" name="Shape 145"/>
           <p:cNvSpPr txBox="1">
             <a:spLocks noGrp="1"/>
           </p:cNvSpPr>
@@ -944,7 +950,7 @@
     </p:spTree>
     <p:extLst>
       <p:ext uri="{BB962C8B-B14F-4D97-AF65-F5344CB8AC3E}">
-        <p14:creationId xmlns:p14="http://schemas.microsoft.com/office/powerpoint/2010/main" val="3748156321"/>
+        <p14:creationId xmlns:p14="http://schemas.microsoft.com/office/powerpoint/2010/main" val="2234372423"/>
       </p:ext>
     </p:extLst>
   </p:cSld>
@@ -959,7 +965,7 @@
   <p:cSld>
     <p:spTree>
       <p:nvGrpSpPr>
-        <p:cNvPr id="1" name="Shape 158"/>
+        <p:cNvPr id="1" name="Shape 152"/>
         <p:cNvGrpSpPr/>
         <p:nvPr/>
       </p:nvGrpSpPr>
@@ -973,7 +979,7 @@
       </p:grpSpPr>
       <p:sp>
         <p:nvSpPr>
-          <p:cNvPr id="159" name="Shape 159"/>
+          <p:cNvPr id="153" name="Shape 153"/>
           <p:cNvSpPr>
             <a:spLocks noGrp="1" noRot="1" noChangeAspect="1"/>
           </p:cNvSpPr>
@@ -1014,7 +1020,7 @@
       </p:sp>
       <p:sp>
         <p:nvSpPr>
-          <p:cNvPr id="160" name="Shape 160"/>
+          <p:cNvPr id="154" name="Shape 154"/>
           <p:cNvSpPr txBox="1">
             <a:spLocks noGrp="1"/>
           </p:cNvSpPr>
@@ -1037,7 +1043,7 @@
           </a:bodyPr>
           <a:lstStyle/>
           <a:p>
-            <a:pPr lvl="0">
+            <a:pPr lvl="0" rtl="0">
               <a:spcBef>
                 <a:spcPts val="0"/>
               </a:spcBef>
@@ -1050,7 +1056,7 @@
     </p:spTree>
     <p:extLst>
       <p:ext uri="{BB962C8B-B14F-4D97-AF65-F5344CB8AC3E}">
-        <p14:creationId xmlns:p14="http://schemas.microsoft.com/office/powerpoint/2010/main" val="2794943945"/>
+        <p14:creationId xmlns:p14="http://schemas.microsoft.com/office/powerpoint/2010/main" val="3748156321"/>
       </p:ext>
     </p:extLst>
   </p:cSld>
@@ -1065,7 +1071,7 @@
   <p:cSld>
     <p:spTree>
       <p:nvGrpSpPr>
-        <p:cNvPr id="1" name="Shape 163"/>
+        <p:cNvPr id="1" name="Shape 158"/>
         <p:cNvGrpSpPr/>
         <p:nvPr/>
       </p:nvGrpSpPr>
@@ -1079,7 +1085,7 @@
       </p:grpSpPr>
       <p:sp>
         <p:nvSpPr>
-          <p:cNvPr id="164" name="Shape 164"/>
+          <p:cNvPr id="159" name="Shape 159"/>
           <p:cNvSpPr>
             <a:spLocks noGrp="1" noRot="1" noChangeAspect="1"/>
           </p:cNvSpPr>
@@ -1120,7 +1126,7 @@
       </p:sp>
       <p:sp>
         <p:nvSpPr>
-          <p:cNvPr id="165" name="Shape 165"/>
+          <p:cNvPr id="160" name="Shape 160"/>
           <p:cNvSpPr txBox="1">
             <a:spLocks noGrp="1"/>
           </p:cNvSpPr>
@@ -1156,7 +1162,7 @@
     </p:spTree>
     <p:extLst>
       <p:ext uri="{BB962C8B-B14F-4D97-AF65-F5344CB8AC3E}">
-        <p14:creationId xmlns:p14="http://schemas.microsoft.com/office/powerpoint/2010/main" val="2392235288"/>
+        <p14:creationId xmlns:p14="http://schemas.microsoft.com/office/powerpoint/2010/main" val="2794943945"/>
       </p:ext>
     </p:extLst>
   </p:cSld>
@@ -1171,7 +1177,7 @@
   <p:cSld>
     <p:spTree>
       <p:nvGrpSpPr>
-        <p:cNvPr id="1" name="Shape 183"/>
+        <p:cNvPr id="1" name="Shape 163"/>
         <p:cNvGrpSpPr/>
         <p:nvPr/>
       </p:nvGrpSpPr>
@@ -1185,7 +1191,7 @@
       </p:grpSpPr>
       <p:sp>
         <p:nvSpPr>
-          <p:cNvPr id="184" name="Shape 184"/>
+          <p:cNvPr id="164" name="Shape 164"/>
           <p:cNvSpPr>
             <a:spLocks noGrp="1" noRot="1" noChangeAspect="1"/>
           </p:cNvSpPr>
@@ -1226,7 +1232,7 @@
       </p:sp>
       <p:sp>
         <p:nvSpPr>
-          <p:cNvPr id="185" name="Shape 185"/>
+          <p:cNvPr id="165" name="Shape 165"/>
           <p:cNvSpPr txBox="1">
             <a:spLocks noGrp="1"/>
           </p:cNvSpPr>
@@ -1262,7 +1268,7 @@
     </p:spTree>
     <p:extLst>
       <p:ext uri="{BB962C8B-B14F-4D97-AF65-F5344CB8AC3E}">
-        <p14:creationId xmlns:p14="http://schemas.microsoft.com/office/powerpoint/2010/main" val="2832199068"/>
+        <p14:creationId xmlns:p14="http://schemas.microsoft.com/office/powerpoint/2010/main" val="2392235288"/>
       </p:ext>
     </p:extLst>
   </p:cSld>
@@ -1277,7 +1283,7 @@
   <p:cSld>
     <p:spTree>
       <p:nvGrpSpPr>
-        <p:cNvPr id="1" name="Shape 197"/>
+        <p:cNvPr id="1" name="Shape 183"/>
         <p:cNvGrpSpPr/>
         <p:nvPr/>
       </p:nvGrpSpPr>
@@ -1291,7 +1297,7 @@
       </p:grpSpPr>
       <p:sp>
         <p:nvSpPr>
-          <p:cNvPr id="198" name="Shape 198"/>
+          <p:cNvPr id="184" name="Shape 184"/>
           <p:cNvSpPr>
             <a:spLocks noGrp="1" noRot="1" noChangeAspect="1"/>
           </p:cNvSpPr>
@@ -1332,7 +1338,7 @@
       </p:sp>
       <p:sp>
         <p:nvSpPr>
-          <p:cNvPr id="199" name="Shape 199"/>
+          <p:cNvPr id="185" name="Shape 185"/>
           <p:cNvSpPr txBox="1">
             <a:spLocks noGrp="1"/>
           </p:cNvSpPr>
@@ -1368,7 +1374,7 @@
     </p:spTree>
     <p:extLst>
       <p:ext uri="{BB962C8B-B14F-4D97-AF65-F5344CB8AC3E}">
-        <p14:creationId xmlns:p14="http://schemas.microsoft.com/office/powerpoint/2010/main" val="582289305"/>
+        <p14:creationId xmlns:p14="http://schemas.microsoft.com/office/powerpoint/2010/main" val="2832199068"/>
       </p:ext>
     </p:extLst>
   </p:cSld>
@@ -1383,7 +1389,7 @@
   <p:cSld>
     <p:spTree>
       <p:nvGrpSpPr>
-        <p:cNvPr id="1" name="Shape 204"/>
+        <p:cNvPr id="1" name="Shape 197"/>
         <p:cNvGrpSpPr/>
         <p:nvPr/>
       </p:nvGrpSpPr>
@@ -1397,7 +1403,7 @@
       </p:grpSpPr>
       <p:sp>
         <p:nvSpPr>
-          <p:cNvPr id="205" name="Shape 205"/>
+          <p:cNvPr id="198" name="Shape 198"/>
           <p:cNvSpPr>
             <a:spLocks noGrp="1" noRot="1" noChangeAspect="1"/>
           </p:cNvSpPr>
@@ -1438,7 +1444,7 @@
       </p:sp>
       <p:sp>
         <p:nvSpPr>
-          <p:cNvPr id="206" name="Shape 206"/>
+          <p:cNvPr id="199" name="Shape 199"/>
           <p:cNvSpPr txBox="1">
             <a:spLocks noGrp="1"/>
           </p:cNvSpPr>
@@ -1474,7 +1480,7 @@
     </p:spTree>
     <p:extLst>
       <p:ext uri="{BB962C8B-B14F-4D97-AF65-F5344CB8AC3E}">
-        <p14:creationId xmlns:p14="http://schemas.microsoft.com/office/powerpoint/2010/main" val="1980633293"/>
+        <p14:creationId xmlns:p14="http://schemas.microsoft.com/office/powerpoint/2010/main" val="582289305"/>
       </p:ext>
     </p:extLst>
   </p:cSld>
@@ -1489,7 +1495,7 @@
   <p:cSld>
     <p:spTree>
       <p:nvGrpSpPr>
-        <p:cNvPr id="1" name="Shape 209"/>
+        <p:cNvPr id="1" name="Shape 204"/>
         <p:cNvGrpSpPr/>
         <p:nvPr/>
       </p:nvGrpSpPr>
@@ -1503,7 +1509,7 @@
       </p:grpSpPr>
       <p:sp>
         <p:nvSpPr>
-          <p:cNvPr id="210" name="Shape 210"/>
+          <p:cNvPr id="205" name="Shape 205"/>
           <p:cNvSpPr>
             <a:spLocks noGrp="1" noRot="1" noChangeAspect="1"/>
           </p:cNvSpPr>
@@ -1544,7 +1550,7 @@
       </p:sp>
       <p:sp>
         <p:nvSpPr>
-          <p:cNvPr id="211" name="Shape 211"/>
+          <p:cNvPr id="206" name="Shape 206"/>
           <p:cNvSpPr txBox="1">
             <a:spLocks noGrp="1"/>
           </p:cNvSpPr>
@@ -1580,7 +1586,7 @@
     </p:spTree>
     <p:extLst>
       <p:ext uri="{BB962C8B-B14F-4D97-AF65-F5344CB8AC3E}">
-        <p14:creationId xmlns:p14="http://schemas.microsoft.com/office/powerpoint/2010/main" val="3114136405"/>
+        <p14:creationId xmlns:p14="http://schemas.microsoft.com/office/powerpoint/2010/main" val="1980633293"/>
       </p:ext>
     </p:extLst>
   </p:cSld>
@@ -1595,7 +1601,7 @@
   <p:cSld>
     <p:spTree>
       <p:nvGrpSpPr>
-        <p:cNvPr id="1" name="Shape 243"/>
+        <p:cNvPr id="1" name="Shape 209"/>
         <p:cNvGrpSpPr/>
         <p:nvPr/>
       </p:nvGrpSpPr>
@@ -1609,7 +1615,7 @@
       </p:grpSpPr>
       <p:sp>
         <p:nvSpPr>
-          <p:cNvPr id="244" name="Shape 244"/>
+          <p:cNvPr id="210" name="Shape 210"/>
           <p:cNvSpPr>
             <a:spLocks noGrp="1" noRot="1" noChangeAspect="1"/>
           </p:cNvSpPr>
@@ -1650,7 +1656,7 @@
       </p:sp>
       <p:sp>
         <p:nvSpPr>
-          <p:cNvPr id="245" name="Shape 245"/>
+          <p:cNvPr id="211" name="Shape 211"/>
           <p:cNvSpPr txBox="1">
             <a:spLocks noGrp="1"/>
           </p:cNvSpPr>
@@ -1686,7 +1692,7 @@
     </p:spTree>
     <p:extLst>
       <p:ext uri="{BB962C8B-B14F-4D97-AF65-F5344CB8AC3E}">
-        <p14:creationId xmlns:p14="http://schemas.microsoft.com/office/powerpoint/2010/main" val="575847709"/>
+        <p14:creationId xmlns:p14="http://schemas.microsoft.com/office/powerpoint/2010/main" val="3114136405"/>
       </p:ext>
     </p:extLst>
   </p:cSld>
@@ -1803,6 +1809,112 @@
 </file>
 
 <file path=ppt/notesSlides/notesSlide20.xml><?xml version="1.0" encoding="utf-8"?>
+<p:notes xmlns:a="http://schemas.openxmlformats.org/drawingml/2006/main" xmlns:r="http://schemas.openxmlformats.org/officeDocument/2006/relationships" xmlns:p="http://schemas.openxmlformats.org/presentationml/2006/main" showMasterSp="0" showMasterPhAnim="0">
+  <p:cSld>
+    <p:spTree>
+      <p:nvGrpSpPr>
+        <p:cNvPr id="1" name="Shape 243"/>
+        <p:cNvGrpSpPr/>
+        <p:nvPr/>
+      </p:nvGrpSpPr>
+      <p:grpSpPr>
+        <a:xfrm>
+          <a:off x="0" y="0"/>
+          <a:ext cx="0" cy="0"/>
+          <a:chOff x="0" y="0"/>
+          <a:chExt cx="0" cy="0"/>
+        </a:xfrm>
+      </p:grpSpPr>
+      <p:sp>
+        <p:nvSpPr>
+          <p:cNvPr id="244" name="Shape 244"/>
+          <p:cNvSpPr>
+            <a:spLocks noGrp="1" noRot="1" noChangeAspect="1"/>
+          </p:cNvSpPr>
+          <p:nvPr>
+            <p:ph type="sldImg" idx="2"/>
+          </p:nvPr>
+        </p:nvSpPr>
+        <p:spPr>
+          <a:xfrm>
+            <a:off x="381000" y="685800"/>
+            <a:ext cx="6096000" cy="3429000"/>
+          </a:xfrm>
+          <a:custGeom>
+            <a:avLst/>
+            <a:gdLst/>
+            <a:ahLst/>
+            <a:cxnLst/>
+            <a:rect l="0" t="0" r="0" b="0"/>
+            <a:pathLst>
+              <a:path w="120000" h="120000" extrusionOk="0">
+                <a:moveTo>
+                  <a:pt x="0" y="0"/>
+                </a:moveTo>
+                <a:lnTo>
+                  <a:pt x="120000" y="0"/>
+                </a:lnTo>
+                <a:lnTo>
+                  <a:pt x="120000" y="120000"/>
+                </a:lnTo>
+                <a:lnTo>
+                  <a:pt x="0" y="120000"/>
+                </a:lnTo>
+                <a:close/>
+              </a:path>
+            </a:pathLst>
+          </a:custGeom>
+        </p:spPr>
+      </p:sp>
+      <p:sp>
+        <p:nvSpPr>
+          <p:cNvPr id="245" name="Shape 245"/>
+          <p:cNvSpPr txBox="1">
+            <a:spLocks noGrp="1"/>
+          </p:cNvSpPr>
+          <p:nvPr>
+            <p:ph type="body" idx="1"/>
+          </p:nvPr>
+        </p:nvSpPr>
+        <p:spPr>
+          <a:xfrm>
+            <a:off x="685800" y="4343400"/>
+            <a:ext cx="5486400" cy="4114800"/>
+          </a:xfrm>
+          <a:prstGeom prst="rect">
+            <a:avLst/>
+          </a:prstGeom>
+        </p:spPr>
+        <p:txBody>
+          <a:bodyPr wrap="square" lIns="91425" tIns="91425" rIns="91425" bIns="91425" anchor="t" anchorCtr="0">
+            <a:noAutofit/>
+          </a:bodyPr>
+          <a:lstStyle/>
+          <a:p>
+            <a:pPr lvl="0">
+              <a:spcBef>
+                <a:spcPts val="0"/>
+              </a:spcBef>
+              <a:buNone/>
+            </a:pPr>
+            <a:endParaRPr/>
+          </a:p>
+        </p:txBody>
+      </p:sp>
+    </p:spTree>
+    <p:extLst>
+      <p:ext uri="{BB962C8B-B14F-4D97-AF65-F5344CB8AC3E}">
+        <p14:creationId xmlns:p14="http://schemas.microsoft.com/office/powerpoint/2010/main" val="575847709"/>
+      </p:ext>
+    </p:extLst>
+  </p:cSld>
+  <p:clrMapOvr>
+    <a:masterClrMapping/>
+  </p:clrMapOvr>
+</p:notes>
+</file>
+
+<file path=ppt/notesSlides/notesSlide21.xml><?xml version="1.0" encoding="utf-8"?>
 <p:notes xmlns:a="http://schemas.openxmlformats.org/drawingml/2006/main" xmlns:r="http://schemas.openxmlformats.org/officeDocument/2006/relationships" xmlns:p="http://schemas.openxmlformats.org/presentationml/2006/main" showMasterSp="0" showMasterPhAnim="0">
   <p:cSld>
     <p:spTree>
@@ -7824,7 +7936,7 @@
   <p:cSld>
     <p:spTree>
       <p:nvGrpSpPr>
-        <p:cNvPr id="1" name="Shape 140"/>
+        <p:cNvPr id="1" name="Shape 134"/>
         <p:cNvGrpSpPr/>
         <p:nvPr/>
       </p:nvGrpSpPr>
@@ -7838,7 +7950,7 @@
       </p:grpSpPr>
       <p:sp>
         <p:nvSpPr>
-          <p:cNvPr id="141" name="Shape 141"/>
+          <p:cNvPr id="135" name="Shape 135"/>
           <p:cNvSpPr txBox="1">
             <a:spLocks noGrp="1"/>
           </p:cNvSpPr>
@@ -7868,15 +7980,16 @@
               <a:buNone/>
             </a:pPr>
             <a:r>
-              <a:rPr lang="en"/>
-              <a:t>Sentiment Analysis</a:t>
+              <a:rPr lang="en" dirty="0" smtClean="0"/>
+              <a:t>Text to Features</a:t>
             </a:r>
+            <a:endParaRPr lang="en" dirty="0"/>
           </a:p>
         </p:txBody>
       </p:sp>
       <p:sp>
         <p:nvSpPr>
-          <p:cNvPr id="142" name="Shape 142"/>
+          <p:cNvPr id="136" name="Shape 136"/>
           <p:cNvSpPr txBox="1">
             <a:spLocks noGrp="1"/>
           </p:cNvSpPr>
@@ -7899,20 +8012,151 @@
           </a:bodyPr>
           <a:lstStyle/>
           <a:p>
-            <a:pPr lvl="0">
-              <a:spcBef>
-                <a:spcPts val="0"/>
-              </a:spcBef>
-              <a:buNone/>
+            <a:pPr marL="228600" lvl="0" indent="-228600">
+              <a:buAutoNum type="arabicPeriod"/>
             </a:pPr>
             <a:r>
-              <a:rPr lang="en"/>
-              <a:t>TODO : To complete ( Probably 2 slides) </a:t>
+              <a:rPr lang="en-US" sz="1400" b="1" dirty="0" smtClean="0"/>
+              <a:t>  Named Entity Recognition (NER) </a:t>
             </a:r>
+            <a:r>
+              <a:rPr lang="en-US" sz="1400" dirty="0"/>
+              <a:t>- </a:t>
+            </a:r>
+            <a:r>
+              <a:rPr lang="en-US" sz="1400" dirty="0"/>
+              <a:t>The process of detecting the named entities such as person names, location names, company names </a:t>
+            </a:r>
+            <a:r>
+              <a:rPr lang="en-US" sz="1400" dirty="0" smtClean="0"/>
+              <a:t>etc. </a:t>
+            </a:r>
+            <a:r>
+              <a:rPr lang="en-US" sz="1400" dirty="0"/>
+              <a:t>from the text is called as </a:t>
+            </a:r>
+            <a:r>
+              <a:rPr lang="en-US" sz="1400" dirty="0" smtClean="0"/>
+              <a:t>NER.</a:t>
+            </a:r>
+          </a:p>
+          <a:p>
+            <a:pPr marL="228600" lvl="0" indent="-228600">
+              <a:buAutoNum type="arabicPeriod"/>
+            </a:pPr>
+            <a:r>
+              <a:rPr lang="en-US" sz="1400" b="1" dirty="0" smtClean="0"/>
+              <a:t>  Topic Modeling </a:t>
+            </a:r>
+            <a:r>
+              <a:rPr lang="en-US" sz="1400" dirty="0"/>
+              <a:t>- </a:t>
+            </a:r>
+            <a:r>
+              <a:rPr lang="en-US" sz="1400" dirty="0"/>
+              <a:t>Topic modeling is a process of automatically identifying the topics present in a text </a:t>
+            </a:r>
+            <a:r>
+              <a:rPr lang="en-US" sz="1400" dirty="0" smtClean="0"/>
+              <a:t>corpus</a:t>
+            </a:r>
+          </a:p>
+          <a:p>
+            <a:pPr marL="342900" lvl="0" indent="-342900">
+              <a:buAutoNum type="arabicPeriod" startAt="3"/>
+            </a:pPr>
+            <a:r>
+              <a:rPr lang="en-US" sz="1400" b="1" dirty="0" smtClean="0"/>
+              <a:t>N-grams as features </a:t>
+            </a:r>
+            <a:r>
+              <a:rPr lang="en-US" sz="1400" dirty="0" smtClean="0"/>
+              <a:t>– </a:t>
+            </a:r>
+            <a:r>
+              <a:rPr lang="en-US" sz="1400" dirty="0"/>
+              <a:t>A combination of N words together are called N-Grams. N grams (N &gt; 1) are generally more informative as compared to words (Unigrams) as features</a:t>
+            </a:r>
+            <a:r>
+              <a:rPr lang="en-US" sz="1400" dirty="0" smtClean="0"/>
+              <a:t>.</a:t>
+            </a:r>
+          </a:p>
+          <a:p>
+            <a:pPr marL="342900" indent="-342900">
+              <a:buFont typeface="Roboto"/>
+              <a:buAutoNum type="arabicPeriod" startAt="3"/>
+            </a:pPr>
+            <a:r>
+              <a:rPr lang="en-US" sz="1400" b="1" dirty="0"/>
+              <a:t>Term Frequency – Inverse Document Frequency (TF – IDF</a:t>
+            </a:r>
+            <a:r>
+              <a:rPr lang="en-US" sz="1400" b="1" dirty="0" smtClean="0"/>
+              <a:t>)</a:t>
+            </a:r>
+            <a:r>
+              <a:rPr lang="en-US" sz="1400" b="1" dirty="0"/>
+              <a:t> </a:t>
+            </a:r>
+            <a:r>
+              <a:rPr lang="en-US" sz="1400" dirty="0" smtClean="0"/>
+              <a:t>- </a:t>
+            </a:r>
+            <a:r>
+              <a:rPr lang="en-US" sz="1400" dirty="0"/>
+              <a:t>TF-IDF is a weighted model commonly used for information retrieval problems.</a:t>
+            </a:r>
           </a:p>
         </p:txBody>
       </p:sp>
+      <p:pic>
+        <p:nvPicPr>
+          <p:cNvPr id="1026" name="Picture 2" descr="https://s3-ap-south-1.amazonaws.com/av-blog-media/wp-content/uploads/2017/01/11181616/image-4.png"/>
+          <p:cNvPicPr>
+            <a:picLocks noChangeAspect="1" noChangeArrowheads="1"/>
+          </p:cNvPicPr>
+          <p:nvPr/>
+        </p:nvPicPr>
+        <p:blipFill>
+          <a:blip r:embed="rId3">
+            <a:extLst>
+              <a:ext uri="{28A0092B-C50C-407E-A947-70E740481C1C}">
+                <a14:useLocalDpi xmlns:a14="http://schemas.microsoft.com/office/drawing/2010/main" val="0"/>
+              </a:ext>
+            </a:extLst>
+          </a:blip>
+          <a:srcRect/>
+          <a:stretch>
+            <a:fillRect/>
+          </a:stretch>
+        </p:blipFill>
+        <p:spPr bwMode="auto">
+          <a:xfrm>
+            <a:off x="3883631" y="3713810"/>
+            <a:ext cx="2393879" cy="1067140"/>
+          </a:xfrm>
+          <a:prstGeom prst="rect">
+            <a:avLst/>
+          </a:prstGeom>
+          <a:noFill/>
+          <a:extLst>
+            <a:ext uri="{909E8E84-426E-40DD-AFC4-6F175D3DCCD1}">
+              <a14:hiddenFill xmlns:a14="http://schemas.microsoft.com/office/drawing/2010/main">
+                <a:solidFill>
+                  <a:srgbClr val="FFFFFF"/>
+                </a:solidFill>
+              </a14:hiddenFill>
+            </a:ext>
+          </a:extLst>
+        </p:spPr>
+      </p:pic>
     </p:spTree>
+    <p:extLst>
+      <p:ext uri="{BB962C8B-B14F-4D97-AF65-F5344CB8AC3E}">
+        <p14:creationId xmlns:p14="http://schemas.microsoft.com/office/powerpoint/2010/main" val="327484518"/>
+      </p:ext>
+    </p:extLst>
   </p:cSld>
   <p:clrMapOvr>
     <a:masterClrMapping/>
@@ -7932,6 +8176,114 @@
   <p:cSld>
     <p:spTree>
       <p:nvGrpSpPr>
+        <p:cNvPr id="1" name="Shape 140"/>
+        <p:cNvGrpSpPr/>
+        <p:nvPr/>
+      </p:nvGrpSpPr>
+      <p:grpSpPr>
+        <a:xfrm>
+          <a:off x="0" y="0"/>
+          <a:ext cx="0" cy="0"/>
+          <a:chOff x="0" y="0"/>
+          <a:chExt cx="0" cy="0"/>
+        </a:xfrm>
+      </p:grpSpPr>
+      <p:sp>
+        <p:nvSpPr>
+          <p:cNvPr id="141" name="Shape 141"/>
+          <p:cNvSpPr txBox="1">
+            <a:spLocks noGrp="1"/>
+          </p:cNvSpPr>
+          <p:nvPr>
+            <p:ph type="title"/>
+          </p:nvPr>
+        </p:nvSpPr>
+        <p:spPr>
+          <a:xfrm>
+            <a:off x="311700" y="410000"/>
+            <a:ext cx="8520600" cy="607800"/>
+          </a:xfrm>
+          <a:prstGeom prst="rect">
+            <a:avLst/>
+          </a:prstGeom>
+        </p:spPr>
+        <p:txBody>
+          <a:bodyPr wrap="square" lIns="91425" tIns="91425" rIns="91425" bIns="91425" anchor="t" anchorCtr="0">
+            <a:noAutofit/>
+          </a:bodyPr>
+          <a:lstStyle/>
+          <a:p>
+            <a:pPr lvl="0">
+              <a:spcBef>
+                <a:spcPts val="0"/>
+              </a:spcBef>
+              <a:buNone/>
+            </a:pPr>
+            <a:r>
+              <a:rPr lang="en"/>
+              <a:t>Sentiment Analysis</a:t>
+            </a:r>
+          </a:p>
+        </p:txBody>
+      </p:sp>
+      <p:sp>
+        <p:nvSpPr>
+          <p:cNvPr id="142" name="Shape 142"/>
+          <p:cNvSpPr txBox="1">
+            <a:spLocks noGrp="1"/>
+          </p:cNvSpPr>
+          <p:nvPr>
+            <p:ph type="body" idx="1"/>
+          </p:nvPr>
+        </p:nvSpPr>
+        <p:spPr>
+          <a:xfrm>
+            <a:off x="311700" y="1229875"/>
+            <a:ext cx="8520600" cy="3339000"/>
+          </a:xfrm>
+          <a:prstGeom prst="rect">
+            <a:avLst/>
+          </a:prstGeom>
+        </p:spPr>
+        <p:txBody>
+          <a:bodyPr wrap="square" lIns="91425" tIns="91425" rIns="91425" bIns="91425" anchor="t" anchorCtr="0">
+            <a:noAutofit/>
+          </a:bodyPr>
+          <a:lstStyle/>
+          <a:p>
+            <a:pPr lvl="0">
+              <a:spcBef>
+                <a:spcPts val="0"/>
+              </a:spcBef>
+              <a:buNone/>
+            </a:pPr>
+            <a:r>
+              <a:rPr lang="en"/>
+              <a:t>TODO : To complete ( Probably 2 slides) </a:t>
+            </a:r>
+          </a:p>
+        </p:txBody>
+      </p:sp>
+    </p:spTree>
+  </p:cSld>
+  <p:clrMapOvr>
+    <a:masterClrMapping/>
+  </p:clrMapOvr>
+  <p:timing>
+    <p:tnLst>
+      <p:par>
+        <p:cTn id="1" dur="indefinite" restart="never" nodeType="tmRoot"/>
+      </p:par>
+    </p:tnLst>
+  </p:timing>
+</p:sld>
+</file>
+
+<file path=ppt/slides/slide12.xml><?xml version="1.0" encoding="utf-8"?>
+<p:sld xmlns:a="http://schemas.openxmlformats.org/drawingml/2006/main" xmlns:r="http://schemas.openxmlformats.org/officeDocument/2006/relationships" xmlns:p="http://schemas.openxmlformats.org/presentationml/2006/main">
+  <p:cSld>
+    <p:spTree>
+      <p:nvGrpSpPr>
         <p:cNvPr id="1" name="Shape 146"/>
         <p:cNvGrpSpPr/>
         <p:nvPr/>
@@ -7976,13 +8328,18 @@
               <a:buNone/>
             </a:pPr>
             <a:r>
-              <a:rPr lang="en" sz="2400"/>
-              <a:t>Basic Implementation without Sentiment Analysis ( for general news headlines )</a:t>
+              <a:rPr lang="en" sz="2400" dirty="0"/>
+              <a:t>Basic Implementation without Sentiment Analysis ( for general news headlines </a:t>
             </a:r>
             <a:r>
-              <a:rPr lang="en"/>
+              <a:rPr lang="en" sz="2400" dirty="0" smtClean="0"/>
+              <a:t>– Reddit Dataset)</a:t>
+            </a:r>
+            <a:r>
+              <a:rPr lang="en" dirty="0" smtClean="0"/>
               <a:t> </a:t>
             </a:r>
+            <a:endParaRPr lang="en" dirty="0"/>
           </a:p>
         </p:txBody>
       </p:sp>
@@ -8018,7 +8375,7 @@
               <a:buChar char="●"/>
             </a:pPr>
             <a:r>
-              <a:rPr lang="en"/>
+              <a:rPr lang="en" dirty="0"/>
               <a:t>Without Text Preprocessing </a:t>
             </a:r>
           </a:p>
@@ -8066,11 +8423,17 @@
         <p:nvGraphicFramePr>
           <p:cNvPr id="150" name="Shape 150"/>
           <p:cNvGraphicFramePr/>
-          <p:nvPr/>
+          <p:nvPr>
+            <p:extLst>
+              <p:ext uri="{D42A27DB-BD31-4B8C-83A1-F6EECF244321}">
+                <p14:modId xmlns:p14="http://schemas.microsoft.com/office/powerpoint/2010/main" val="1309224335"/>
+              </p:ext>
+            </p:extLst>
+          </p:nvPr>
         </p:nvGraphicFramePr>
         <p:xfrm>
           <a:off x="5157100" y="1704775"/>
-          <a:ext cx="3034400" cy="2104750"/>
+          <a:ext cx="3034400" cy="1683800"/>
         </p:xfrm>
         <a:graphic>
           <a:graphicData uri="http://schemas.openxmlformats.org/drawingml/2006/table">
@@ -8096,7 +8459,7 @@
                         <a:buNone/>
                       </a:pPr>
                       <a:r>
-                        <a:rPr lang="en" b="1"/>
+                        <a:rPr lang="en" b="1" dirty="0"/>
                         <a:t>Classifier Used</a:t>
                       </a:r>
                     </a:p>
@@ -8154,7 +8517,11 @@
                         </a:spcBef>
                         <a:buNone/>
                       </a:pPr>
-                      <a:endParaRPr/>
+                      <a:r>
+                        <a:rPr lang="en-US" dirty="0" smtClean="0"/>
+                        <a:t>56.35 %</a:t>
+                      </a:r>
+                      <a:endParaRPr dirty="0"/>
                     </a:p>
                   </a:txBody>
                   <a:tcPr marL="91425" marR="91425" marT="91425" marB="91425"/>
@@ -8191,7 +8558,11 @@
                         </a:spcBef>
                         <a:buNone/>
                       </a:pPr>
-                      <a:endParaRPr/>
+                      <a:r>
+                        <a:rPr lang="en-US" dirty="0" smtClean="0"/>
+                        <a:t>55.82 %</a:t>
+                      </a:r>
+                      <a:endParaRPr dirty="0"/>
                     </a:p>
                   </a:txBody>
                   <a:tcPr marL="91425" marR="91425" marT="91425" marB="91425"/>
@@ -8210,9 +8581,14 @@
                         <a:buNone/>
                       </a:pPr>
                       <a:r>
-                        <a:rPr lang="en"/>
-                        <a:t>Decision Trees</a:t>
+                        <a:rPr lang="en" dirty="0" smtClean="0"/>
+                        <a:t>Random</a:t>
                       </a:r>
+                      <a:r>
+                        <a:rPr lang="en" baseline="0" dirty="0" smtClean="0"/>
+                        <a:t> Forest</a:t>
+                      </a:r>
+                      <a:endParaRPr lang="en" dirty="0"/>
                     </a:p>
                   </a:txBody>
                   <a:tcPr marL="91425" marR="91425" marT="91425" marB="91425"/>
@@ -8228,44 +8604,11 @@
                         </a:spcBef>
                         <a:buNone/>
                       </a:pPr>
-                      <a:endParaRPr/>
-                    </a:p>
-                  </a:txBody>
-                  <a:tcPr marL="91425" marR="91425" marT="91425" marB="91425"/>
-                </a:tc>
-              </a:tr>
-              <a:tr h="420950">
-                <a:tc>
-                  <a:txBody>
-                    <a:bodyPr/>
-                    <a:lstStyle/>
-                    <a:p>
-                      <a:pPr lvl="0">
-                        <a:spcBef>
-                          <a:spcPts val="0"/>
-                        </a:spcBef>
-                        <a:buNone/>
-                      </a:pPr>
                       <a:r>
-                        <a:rPr lang="en"/>
-                        <a:t>Naive Bayesian</a:t>
+                        <a:rPr lang="en-US" dirty="0" smtClean="0"/>
+                        <a:t>56.61 %</a:t>
                       </a:r>
-                    </a:p>
-                  </a:txBody>
-                  <a:tcPr marL="91425" marR="91425" marT="91425" marB="91425"/>
-                </a:tc>
-                <a:tc>
-                  <a:txBody>
-                    <a:bodyPr/>
-                    <a:lstStyle/>
-                    <a:p>
-                      <a:pPr lvl="0">
-                        <a:spcBef>
-                          <a:spcPts val="0"/>
-                        </a:spcBef>
-                        <a:buNone/>
-                      </a:pPr>
-                      <a:endParaRPr/>
+                      <a:endParaRPr dirty="0"/>
                     </a:p>
                   </a:txBody>
                   <a:tcPr marL="91425" marR="91425" marT="91425" marB="91425"/>
@@ -8279,11 +8622,17 @@
         <p:nvGraphicFramePr>
           <p:cNvPr id="151" name="Shape 151"/>
           <p:cNvGraphicFramePr/>
-          <p:nvPr/>
+          <p:nvPr>
+            <p:extLst>
+              <p:ext uri="{D42A27DB-BD31-4B8C-83A1-F6EECF244321}">
+                <p14:modId xmlns:p14="http://schemas.microsoft.com/office/powerpoint/2010/main" val="3726077678"/>
+              </p:ext>
+            </p:extLst>
+          </p:nvPr>
         </p:nvGraphicFramePr>
         <p:xfrm>
           <a:off x="912950" y="1704775"/>
-          <a:ext cx="3034400" cy="2104750"/>
+          <a:ext cx="3034400" cy="1683800"/>
         </p:xfrm>
         <a:graphic>
           <a:graphicData uri="http://schemas.openxmlformats.org/drawingml/2006/table">
@@ -8309,7 +8658,7 @@
                         <a:buNone/>
                       </a:pPr>
                       <a:r>
-                        <a:rPr lang="en" b="1"/>
+                        <a:rPr lang="en" b="1" dirty="0"/>
                         <a:t>Classifier Used</a:t>
                       </a:r>
                     </a:p>
@@ -8367,7 +8716,15 @@
                         </a:spcBef>
                         <a:buNone/>
                       </a:pPr>
-                      <a:endParaRPr/>
+                      <a:r>
+                        <a:rPr lang="en-US" dirty="0" smtClean="0"/>
+                        <a:t>51.58</a:t>
+                      </a:r>
+                      <a:r>
+                        <a:rPr lang="en-US" baseline="0" dirty="0" smtClean="0"/>
+                        <a:t> %</a:t>
+                      </a:r>
+                      <a:endParaRPr dirty="0"/>
                     </a:p>
                   </a:txBody>
                   <a:tcPr marL="91425" marR="91425" marT="91425" marB="91425"/>
@@ -8404,7 +8761,11 @@
                         </a:spcBef>
                         <a:buNone/>
                       </a:pPr>
-                      <a:endParaRPr/>
+                      <a:r>
+                        <a:rPr lang="en-US" dirty="0" smtClean="0"/>
+                        <a:t>42.32 %</a:t>
+                      </a:r>
+                      <a:endParaRPr dirty="0"/>
                     </a:p>
                   </a:txBody>
                   <a:tcPr marL="91425" marR="91425" marT="91425" marB="91425"/>
@@ -8423,9 +8784,14 @@
                         <a:buNone/>
                       </a:pPr>
                       <a:r>
-                        <a:rPr lang="en"/>
-                        <a:t>Decision Trees</a:t>
+                        <a:rPr lang="en" dirty="0" smtClean="0"/>
+                        <a:t>Random</a:t>
                       </a:r>
+                      <a:r>
+                        <a:rPr lang="en" baseline="0" dirty="0" smtClean="0"/>
+                        <a:t> Forest</a:t>
+                      </a:r>
+                      <a:endParaRPr lang="en" dirty="0"/>
                     </a:p>
                   </a:txBody>
                   <a:tcPr marL="91425" marR="91425" marT="91425" marB="91425"/>
@@ -8441,44 +8807,11 @@
                         </a:spcBef>
                         <a:buNone/>
                       </a:pPr>
-                      <a:endParaRPr/>
-                    </a:p>
-                  </a:txBody>
-                  <a:tcPr marL="91425" marR="91425" marT="91425" marB="91425"/>
-                </a:tc>
-              </a:tr>
-              <a:tr h="420950">
-                <a:tc>
-                  <a:txBody>
-                    <a:bodyPr/>
-                    <a:lstStyle/>
-                    <a:p>
-                      <a:pPr lvl="0" rtl="0">
-                        <a:spcBef>
-                          <a:spcPts val="0"/>
-                        </a:spcBef>
-                        <a:buNone/>
-                      </a:pPr>
                       <a:r>
-                        <a:rPr lang="en"/>
-                        <a:t>Naive Bayesian</a:t>
+                        <a:rPr lang="en-US" dirty="0" smtClean="0"/>
+                        <a:t>49.73 %</a:t>
                       </a:r>
-                    </a:p>
-                  </a:txBody>
-                  <a:tcPr marL="91425" marR="91425" marT="91425" marB="91425"/>
-                </a:tc>
-                <a:tc>
-                  <a:txBody>
-                    <a:bodyPr/>
-                    <a:lstStyle/>
-                    <a:p>
-                      <a:pPr lvl="0" rtl="0">
-                        <a:spcBef>
-                          <a:spcPts val="0"/>
-                        </a:spcBef>
-                        <a:buNone/>
-                      </a:pPr>
-                      <a:endParaRPr/>
+                      <a:endParaRPr dirty="0"/>
                     </a:p>
                   </a:txBody>
                   <a:tcPr marL="91425" marR="91425" marT="91425" marB="91425"/>
@@ -8503,7 +8836,7 @@
 </p:sld>
 </file>
 
-<file path=ppt/slides/slide12.xml><?xml version="1.0" encoding="utf-8"?>
+<file path=ppt/slides/slide13.xml><?xml version="1.0" encoding="utf-8"?>
 <p:sld xmlns:a="http://schemas.openxmlformats.org/drawingml/2006/main" xmlns:r="http://schemas.openxmlformats.org/officeDocument/2006/relationships" xmlns:p="http://schemas.openxmlformats.org/presentationml/2006/main">
   <p:cSld>
     <p:spTree>
@@ -8677,7 +9010,7 @@
 </p:sld>
 </file>
 
-<file path=ppt/slides/slide13.xml><?xml version="1.0" encoding="utf-8"?>
+<file path=ppt/slides/slide14.xml><?xml version="1.0" encoding="utf-8"?>
 <p:sld xmlns:a="http://schemas.openxmlformats.org/drawingml/2006/main" xmlns:r="http://schemas.openxmlformats.org/officeDocument/2006/relationships" xmlns:p="http://schemas.openxmlformats.org/presentationml/2006/main">
   <p:cSld>
     <p:spTree>
@@ -8726,32 +9059,25 @@
               <a:buNone/>
             </a:pPr>
             <a:r>
-              <a:rPr lang="en"/>
+              <a:rPr lang="en" dirty="0"/>
               <a:t>Thank You</a:t>
             </a:r>
             <a:br>
-              <a:rPr lang="en"/>
+              <a:rPr lang="en" dirty="0"/>
             </a:br>
             <a:r>
-              <a:rPr lang="en"/>
+              <a:rPr lang="en" dirty="0"/>
               <a:t/>
             </a:r>
             <a:br>
-              <a:rPr lang="en"/>
+              <a:rPr lang="en" dirty="0"/>
             </a:br>
-            <a:r>
-              <a:rPr lang="en" sz="1400"/>
-              <a:t>Project GitHub Link :  </a:t>
-            </a:r>
-            <a:r>
-              <a:rPr lang="en" sz="1400" u="sng">
-                <a:solidFill>
-                  <a:schemeClr val="hlink"/>
-                </a:solidFill>
-                <a:hlinkClick r:id="rId3"/>
-              </a:rPr>
-              <a:t>https://github.com/Anshul-Goyal/FY_Project</a:t>
-            </a:r>
+            <a:endParaRPr lang="en" sz="1400" u="sng" dirty="0">
+              <a:solidFill>
+                <a:schemeClr val="hlink"/>
+              </a:solidFill>
+              <a:hlinkClick r:id="rId3"/>
+            </a:endParaRPr>
           </a:p>
         </p:txBody>
       </p:sp>
@@ -8770,7 +9096,7 @@
 </p:sld>
 </file>
 
-<file path=ppt/slides/slide14.xml><?xml version="1.0" encoding="utf-8"?>
+<file path=ppt/slides/slide15.xml><?xml version="1.0" encoding="utf-8"?>
 <p:sld xmlns:a="http://schemas.openxmlformats.org/drawingml/2006/main" xmlns:r="http://schemas.openxmlformats.org/officeDocument/2006/relationships" xmlns:p="http://schemas.openxmlformats.org/presentationml/2006/main" show="0">
   <p:cSld>
     <p:spTree>
@@ -9382,11 +9708,11 @@
   <p:clrMapOvr>
     <a:masterClrMapping/>
   </p:clrMapOvr>
-  <mc:AlternateContent xmlns:mc="http://schemas.openxmlformats.org/markup-compatibility/2006">
-    <mc:Choice xmlns:p14="http://schemas.microsoft.com/office/powerpoint/2010/main" Requires="p14">
+  <mc:AlternateContent xmlns:mc="http://schemas.openxmlformats.org/markup-compatibility/2006" xmlns:p14="http://schemas.microsoft.com/office/powerpoint/2010/main">
+    <mc:Choice Requires="p14">
       <p:transition spd="slow" p14:dur="2000"/>
     </mc:Choice>
-    <mc:Fallback>
+    <mc:Fallback xmlns="">
       <p:transition spd="slow"/>
     </mc:Fallback>
   </mc:AlternateContent>
@@ -9400,7 +9726,7 @@
 </p:sld>
 </file>
 
-<file path=ppt/slides/slide15.xml><?xml version="1.0" encoding="utf-8"?>
+<file path=ppt/slides/slide16.xml><?xml version="1.0" encoding="utf-8"?>
 <p:sld xmlns:a="http://schemas.openxmlformats.org/drawingml/2006/main" xmlns:r="http://schemas.openxmlformats.org/officeDocument/2006/relationships" xmlns:p="http://schemas.openxmlformats.org/presentationml/2006/main" show="0">
   <p:cSld>
     <p:spTree>
@@ -9905,18 +10231,18 @@
   <p:clrMapOvr>
     <a:masterClrMapping/>
   </p:clrMapOvr>
-  <mc:AlternateContent xmlns:mc="http://schemas.openxmlformats.org/markup-compatibility/2006">
-    <mc:Choice xmlns:p14="http://schemas.microsoft.com/office/powerpoint/2010/main" Requires="p14">
+  <mc:AlternateContent xmlns:mc="http://schemas.openxmlformats.org/markup-compatibility/2006" xmlns:p14="http://schemas.microsoft.com/office/powerpoint/2010/main">
+    <mc:Choice Requires="p14">
       <p:transition spd="slow" p14:dur="2000"/>
     </mc:Choice>
-    <mc:Fallback>
+    <mc:Fallback xmlns="">
       <p:transition spd="slow"/>
     </mc:Fallback>
   </mc:AlternateContent>
 </p:sld>
 </file>
 
-<file path=ppt/slides/slide16.xml><?xml version="1.0" encoding="utf-8"?>
+<file path=ppt/slides/slide17.xml><?xml version="1.0" encoding="utf-8"?>
 <p:sld xmlns:a="http://schemas.openxmlformats.org/drawingml/2006/main" xmlns:r="http://schemas.openxmlformats.org/officeDocument/2006/relationships" xmlns:p="http://schemas.openxmlformats.org/presentationml/2006/main" show="0">
   <p:cSld>
     <p:spTree>
@@ -10052,18 +10378,18 @@
   <p:clrMapOvr>
     <a:masterClrMapping/>
   </p:clrMapOvr>
-  <mc:AlternateContent xmlns:mc="http://schemas.openxmlformats.org/markup-compatibility/2006">
-    <mc:Choice xmlns:p14="http://schemas.microsoft.com/office/powerpoint/2010/main" Requires="p14">
+  <mc:AlternateContent xmlns:mc="http://schemas.openxmlformats.org/markup-compatibility/2006" xmlns:p14="http://schemas.microsoft.com/office/powerpoint/2010/main">
+    <mc:Choice Requires="p14">
       <p:transition spd="slow" p14:dur="2000"/>
     </mc:Choice>
-    <mc:Fallback>
+    <mc:Fallback xmlns="">
       <p:transition spd="slow"/>
     </mc:Fallback>
   </mc:AlternateContent>
 </p:sld>
 </file>
 
-<file path=ppt/slides/slide17.xml><?xml version="1.0" encoding="utf-8"?>
+<file path=ppt/slides/slide18.xml><?xml version="1.0" encoding="utf-8"?>
 <p:sld xmlns:a="http://schemas.openxmlformats.org/drawingml/2006/main" xmlns:r="http://schemas.openxmlformats.org/officeDocument/2006/relationships" xmlns:p="http://schemas.openxmlformats.org/presentationml/2006/main" show="0">
   <p:cSld>
     <p:spTree>
@@ -10123,18 +10449,18 @@
   <p:clrMapOvr>
     <a:masterClrMapping/>
   </p:clrMapOvr>
-  <mc:AlternateContent xmlns:mc="http://schemas.openxmlformats.org/markup-compatibility/2006">
-    <mc:Choice xmlns:p14="http://schemas.microsoft.com/office/powerpoint/2010/main" Requires="p14">
+  <mc:AlternateContent xmlns:mc="http://schemas.openxmlformats.org/markup-compatibility/2006" xmlns:p14="http://schemas.microsoft.com/office/powerpoint/2010/main">
+    <mc:Choice Requires="p14">
       <p:transition spd="slow" p14:dur="2000"/>
     </mc:Choice>
-    <mc:Fallback>
+    <mc:Fallback xmlns="">
       <p:transition spd="slow"/>
     </mc:Fallback>
   </mc:AlternateContent>
 </p:sld>
 </file>
 
-<file path=ppt/slides/slide18.xml><?xml version="1.0" encoding="utf-8"?>
+<file path=ppt/slides/slide19.xml><?xml version="1.0" encoding="utf-8"?>
 <p:sld xmlns:a="http://schemas.openxmlformats.org/drawingml/2006/main" xmlns:r="http://schemas.openxmlformats.org/officeDocument/2006/relationships" xmlns:p="http://schemas.openxmlformats.org/presentationml/2006/main" show="0">
   <p:cSld>
     <p:spTree>
@@ -11201,18 +11527,157 @@
   <p:clrMapOvr>
     <a:masterClrMapping/>
   </p:clrMapOvr>
-  <mc:AlternateContent xmlns:mc="http://schemas.openxmlformats.org/markup-compatibility/2006">
-    <mc:Choice xmlns:p14="http://schemas.microsoft.com/office/powerpoint/2010/main" Requires="p14">
+  <mc:AlternateContent xmlns:mc="http://schemas.openxmlformats.org/markup-compatibility/2006" xmlns:p14="http://schemas.microsoft.com/office/powerpoint/2010/main">
+    <mc:Choice Requires="p14">
       <p:transition spd="slow" p14:dur="2000"/>
     </mc:Choice>
-    <mc:Fallback>
+    <mc:Fallback xmlns="">
       <p:transition spd="slow"/>
     </mc:Fallback>
   </mc:AlternateContent>
 </p:sld>
 </file>
 
-<file path=ppt/slides/slide19.xml><?xml version="1.0" encoding="utf-8"?>
+<file path=ppt/slides/slide2.xml><?xml version="1.0" encoding="utf-8"?>
+<p:sld xmlns:a="http://schemas.openxmlformats.org/drawingml/2006/main" xmlns:r="http://schemas.openxmlformats.org/officeDocument/2006/relationships" xmlns:p="http://schemas.openxmlformats.org/presentationml/2006/main">
+  <p:cSld>
+    <p:spTree>
+      <p:nvGrpSpPr>
+        <p:cNvPr id="1" name="Shape 90"/>
+        <p:cNvGrpSpPr/>
+        <p:nvPr/>
+      </p:nvGrpSpPr>
+      <p:grpSpPr>
+        <a:xfrm>
+          <a:off x="0" y="0"/>
+          <a:ext cx="0" cy="0"/>
+          <a:chOff x="0" y="0"/>
+          <a:chExt cx="0" cy="0"/>
+        </a:xfrm>
+      </p:grpSpPr>
+      <p:sp>
+        <p:nvSpPr>
+          <p:cNvPr id="91" name="Shape 91"/>
+          <p:cNvSpPr txBox="1">
+            <a:spLocks noGrp="1"/>
+          </p:cNvSpPr>
+          <p:nvPr>
+            <p:ph type="title"/>
+          </p:nvPr>
+        </p:nvSpPr>
+        <p:spPr>
+          <a:xfrm>
+            <a:off x="311700" y="410000"/>
+            <a:ext cx="8520600" cy="607800"/>
+          </a:xfrm>
+          <a:prstGeom prst="rect">
+            <a:avLst/>
+          </a:prstGeom>
+        </p:spPr>
+        <p:txBody>
+          <a:bodyPr wrap="square" lIns="91425" tIns="91425" rIns="91425" bIns="91425" anchor="t" anchorCtr="0">
+            <a:noAutofit/>
+          </a:bodyPr>
+          <a:lstStyle/>
+          <a:p>
+            <a:pPr lvl="0">
+              <a:spcBef>
+                <a:spcPts val="0"/>
+              </a:spcBef>
+              <a:buNone/>
+            </a:pPr>
+            <a:r>
+              <a:rPr lang="en" dirty="0" smtClean="0"/>
+              <a:t>Problem Statement</a:t>
+            </a:r>
+            <a:endParaRPr lang="en" dirty="0"/>
+          </a:p>
+        </p:txBody>
+      </p:sp>
+      <p:sp>
+        <p:nvSpPr>
+          <p:cNvPr id="92" name="Shape 92"/>
+          <p:cNvSpPr txBox="1">
+            <a:spLocks noGrp="1"/>
+          </p:cNvSpPr>
+          <p:nvPr>
+            <p:ph type="body" idx="1"/>
+          </p:nvPr>
+        </p:nvSpPr>
+        <p:spPr>
+          <a:xfrm>
+            <a:off x="311700" y="1229875"/>
+            <a:ext cx="8520600" cy="3339000"/>
+          </a:xfrm>
+          <a:prstGeom prst="rect">
+            <a:avLst/>
+          </a:prstGeom>
+        </p:spPr>
+        <p:txBody>
+          <a:bodyPr wrap="square" lIns="91425" tIns="91425" rIns="91425" bIns="91425" anchor="t" anchorCtr="0">
+            <a:noAutofit/>
+          </a:bodyPr>
+          <a:lstStyle/>
+          <a:p>
+            <a:pPr lvl="0">
+              <a:spcBef>
+                <a:spcPts val="0"/>
+              </a:spcBef>
+              <a:buNone/>
+            </a:pPr>
+            <a:r>
+              <a:rPr lang="en"/>
+              <a:t>Financial market analysis on the basis of financial news and social media data has drawn a lot of attention recently. The objective of this study is to develop a market sentiment model for financial markets using machine learning and see its impact on various financial market indicators.</a:t>
+            </a:r>
+          </a:p>
+          <a:p>
+            <a:pPr lvl="0">
+              <a:spcBef>
+                <a:spcPts val="0"/>
+              </a:spcBef>
+              <a:buNone/>
+            </a:pPr>
+            <a:r>
+              <a:rPr lang="en"/>
+              <a:t>Due to the volatility of the financial market, price fluctuations based on news reports and social media sentiment are common. Traders draw upon a wide variety of publicly-available information to inform their market decisions.</a:t>
+            </a:r>
+          </a:p>
+          <a:p>
+            <a:pPr lvl="0">
+              <a:spcBef>
+                <a:spcPts val="0"/>
+              </a:spcBef>
+              <a:buNone/>
+            </a:pPr>
+            <a:endParaRPr/>
+          </a:p>
+          <a:p>
+            <a:pPr lvl="0">
+              <a:spcBef>
+                <a:spcPts val="0"/>
+              </a:spcBef>
+              <a:buNone/>
+            </a:pPr>
+            <a:endParaRPr/>
+          </a:p>
+        </p:txBody>
+      </p:sp>
+    </p:spTree>
+  </p:cSld>
+  <p:clrMapOvr>
+    <a:masterClrMapping/>
+  </p:clrMapOvr>
+  <p:timing>
+    <p:tnLst>
+      <p:par>
+        <p:cTn id="1" dur="indefinite" restart="never" nodeType="tmRoot"/>
+      </p:par>
+    </p:tnLst>
+  </p:timing>
+</p:sld>
+</file>
+
+<file path=ppt/slides/slide20.xml><?xml version="1.0" encoding="utf-8"?>
 <p:sld xmlns:a="http://schemas.openxmlformats.org/drawingml/2006/main" xmlns:r="http://schemas.openxmlformats.org/officeDocument/2006/relationships" xmlns:p="http://schemas.openxmlformats.org/presentationml/2006/main" show="0">
   <p:cSld>
     <p:spTree>
@@ -12924,156 +13389,18 @@
   <p:clrMapOvr>
     <a:masterClrMapping/>
   </p:clrMapOvr>
-  <mc:AlternateContent xmlns:mc="http://schemas.openxmlformats.org/markup-compatibility/2006">
-    <mc:Choice xmlns:p14="http://schemas.microsoft.com/office/powerpoint/2010/main" Requires="p14">
+  <mc:AlternateContent xmlns:mc="http://schemas.openxmlformats.org/markup-compatibility/2006" xmlns:p14="http://schemas.microsoft.com/office/powerpoint/2010/main">
+    <mc:Choice Requires="p14">
       <p:transition spd="slow" p14:dur="2000"/>
     </mc:Choice>
-    <mc:Fallback>
+    <mc:Fallback xmlns="">
       <p:transition spd="slow"/>
     </mc:Fallback>
   </mc:AlternateContent>
 </p:sld>
 </file>
 
-<file path=ppt/slides/slide2.xml><?xml version="1.0" encoding="utf-8"?>
-<p:sld xmlns:a="http://schemas.openxmlformats.org/drawingml/2006/main" xmlns:r="http://schemas.openxmlformats.org/officeDocument/2006/relationships" xmlns:p="http://schemas.openxmlformats.org/presentationml/2006/main">
-  <p:cSld>
-    <p:spTree>
-      <p:nvGrpSpPr>
-        <p:cNvPr id="1" name="Shape 90"/>
-        <p:cNvGrpSpPr/>
-        <p:nvPr/>
-      </p:nvGrpSpPr>
-      <p:grpSpPr>
-        <a:xfrm>
-          <a:off x="0" y="0"/>
-          <a:ext cx="0" cy="0"/>
-          <a:chOff x="0" y="0"/>
-          <a:chExt cx="0" cy="0"/>
-        </a:xfrm>
-      </p:grpSpPr>
-      <p:sp>
-        <p:nvSpPr>
-          <p:cNvPr id="91" name="Shape 91"/>
-          <p:cNvSpPr txBox="1">
-            <a:spLocks noGrp="1"/>
-          </p:cNvSpPr>
-          <p:nvPr>
-            <p:ph type="title"/>
-          </p:nvPr>
-        </p:nvSpPr>
-        <p:spPr>
-          <a:xfrm>
-            <a:off x="311700" y="410000"/>
-            <a:ext cx="8520600" cy="607800"/>
-          </a:xfrm>
-          <a:prstGeom prst="rect">
-            <a:avLst/>
-          </a:prstGeom>
-        </p:spPr>
-        <p:txBody>
-          <a:bodyPr wrap="square" lIns="91425" tIns="91425" rIns="91425" bIns="91425" anchor="t" anchorCtr="0">
-            <a:noAutofit/>
-          </a:bodyPr>
-          <a:lstStyle/>
-          <a:p>
-            <a:pPr lvl="0">
-              <a:spcBef>
-                <a:spcPts val="0"/>
-              </a:spcBef>
-              <a:buNone/>
-            </a:pPr>
-            <a:r>
-              <a:rPr lang="en"/>
-              <a:t>Introduction</a:t>
-            </a:r>
-          </a:p>
-        </p:txBody>
-      </p:sp>
-      <p:sp>
-        <p:nvSpPr>
-          <p:cNvPr id="92" name="Shape 92"/>
-          <p:cNvSpPr txBox="1">
-            <a:spLocks noGrp="1"/>
-          </p:cNvSpPr>
-          <p:nvPr>
-            <p:ph type="body" idx="1"/>
-          </p:nvPr>
-        </p:nvSpPr>
-        <p:spPr>
-          <a:xfrm>
-            <a:off x="311700" y="1229875"/>
-            <a:ext cx="8520600" cy="3339000"/>
-          </a:xfrm>
-          <a:prstGeom prst="rect">
-            <a:avLst/>
-          </a:prstGeom>
-        </p:spPr>
-        <p:txBody>
-          <a:bodyPr wrap="square" lIns="91425" tIns="91425" rIns="91425" bIns="91425" anchor="t" anchorCtr="0">
-            <a:noAutofit/>
-          </a:bodyPr>
-          <a:lstStyle/>
-          <a:p>
-            <a:pPr lvl="0">
-              <a:spcBef>
-                <a:spcPts val="0"/>
-              </a:spcBef>
-              <a:buNone/>
-            </a:pPr>
-            <a:r>
-              <a:rPr lang="en"/>
-              <a:t>Financial market analysis on the basis of financial news and social media data has drawn a lot of attention recently. The objective of this study is to develop a market sentiment model for financial markets using machine learning and see its impact on various financial market indicators.</a:t>
-            </a:r>
-          </a:p>
-          <a:p>
-            <a:pPr lvl="0">
-              <a:spcBef>
-                <a:spcPts val="0"/>
-              </a:spcBef>
-              <a:buNone/>
-            </a:pPr>
-            <a:r>
-              <a:rPr lang="en"/>
-              <a:t>Due to the volatility of the financial market, price fluctuations based on news reports and social media sentiment are common. Traders draw upon a wide variety of publicly-available information to inform their market decisions.</a:t>
-            </a:r>
-          </a:p>
-          <a:p>
-            <a:pPr lvl="0">
-              <a:spcBef>
-                <a:spcPts val="0"/>
-              </a:spcBef>
-              <a:buNone/>
-            </a:pPr>
-            <a:endParaRPr/>
-          </a:p>
-          <a:p>
-            <a:pPr lvl="0">
-              <a:spcBef>
-                <a:spcPts val="0"/>
-              </a:spcBef>
-              <a:buNone/>
-            </a:pPr>
-            <a:endParaRPr/>
-          </a:p>
-        </p:txBody>
-      </p:sp>
-    </p:spTree>
-  </p:cSld>
-  <p:clrMapOvr>
-    <a:masterClrMapping/>
-  </p:clrMapOvr>
-  <p:timing>
-    <p:tnLst>
-      <p:par>
-        <p:cTn id="1" dur="indefinite" restart="never" nodeType="tmRoot"/>
-      </p:par>
-    </p:tnLst>
-  </p:timing>
-</p:sld>
-</file>
-
-<file path=ppt/slides/slide20.xml><?xml version="1.0" encoding="utf-8"?>
+<file path=ppt/slides/slide21.xml><?xml version="1.0" encoding="utf-8"?>
 <p:sld xmlns:a="http://schemas.openxmlformats.org/drawingml/2006/main" xmlns:r="http://schemas.openxmlformats.org/officeDocument/2006/relationships" xmlns:p="http://schemas.openxmlformats.org/presentationml/2006/main" show="0">
   <p:cSld>
     <p:spTree>
@@ -14455,11 +14782,11 @@
   <p:clrMapOvr>
     <a:masterClrMapping/>
   </p:clrMapOvr>
-  <mc:AlternateContent xmlns:mc="http://schemas.openxmlformats.org/markup-compatibility/2006">
-    <mc:Choice xmlns:p14="http://schemas.microsoft.com/office/powerpoint/2010/main" Requires="p14">
+  <mc:AlternateContent xmlns:mc="http://schemas.openxmlformats.org/markup-compatibility/2006" xmlns:p14="http://schemas.microsoft.com/office/powerpoint/2010/main">
+    <mc:Choice Requires="p14">
       <p:transition spd="slow" p14:dur="2000"/>
     </mc:Choice>
-    <mc:Fallback>
+    <mc:Fallback xmlns="">
       <p:transition spd="slow"/>
     </mc:Fallback>
   </mc:AlternateContent>
@@ -15421,50 +15748,85 @@
               <a:buNone/>
             </a:pPr>
             <a:r>
-              <a:rPr lang="en"/>
-              <a:t>High Level Flow Diagram</a:t>
+              <a:rPr lang="en" dirty="0" smtClean="0"/>
+              <a:t/>
             </a:r>
+            <a:br>
+              <a:rPr lang="en" dirty="0" smtClean="0"/>
+            </a:br>
+            <a:r>
+              <a:rPr lang="en" dirty="0"/>
+              <a:t/>
+            </a:r>
+            <a:br>
+              <a:rPr lang="en" dirty="0"/>
+            </a:br>
+            <a:r>
+              <a:rPr lang="en" dirty="0" smtClean="0"/>
+              <a:t>High </a:t>
+            </a:r>
+            <a:r>
+              <a:rPr lang="en" dirty="0"/>
+              <a:t>Level </a:t>
+            </a:r>
+            <a:r>
+              <a:rPr lang="en" dirty="0" smtClean="0"/>
+              <a:t/>
+            </a:r>
+            <a:br>
+              <a:rPr lang="en" dirty="0" smtClean="0"/>
+            </a:br>
+            <a:r>
+              <a:rPr lang="en" dirty="0" smtClean="0"/>
+              <a:t>Flow </a:t>
+            </a:r>
+            <a:r>
+              <a:rPr lang="en" dirty="0"/>
+              <a:t>Diagram</a:t>
+            </a:r>
           </a:p>
         </p:txBody>
       </p:sp>
-      <p:sp>
-        <p:nvSpPr>
-          <p:cNvPr id="130" name="Shape 130"/>
-          <p:cNvSpPr txBox="1">
-            <a:spLocks noGrp="1"/>
-          </p:cNvSpPr>
-          <p:nvPr>
-            <p:ph type="body" idx="1"/>
-          </p:nvPr>
-        </p:nvSpPr>
-        <p:spPr>
-          <a:xfrm>
-            <a:off x="311700" y="1229875"/>
-            <a:ext cx="8520600" cy="3339000"/>
+      <p:pic>
+        <p:nvPicPr>
+          <p:cNvPr id="2" name="Picture 1"/>
+          <p:cNvPicPr>
+            <a:picLocks noChangeAspect="1"/>
+          </p:cNvPicPr>
+          <p:nvPr/>
+        </p:nvPicPr>
+        <p:blipFill>
+          <a:blip r:embed="rId3">
+            <a:extLst>
+              <a:ext uri="{28A0092B-C50C-407E-A947-70E740481C1C}">
+                <a14:useLocalDpi xmlns:a14="http://schemas.microsoft.com/office/drawing/2010/main" val="0"/>
+              </a:ext>
+            </a:extLst>
+          </a:blip>
+          <a:stretch>
+            <a:fillRect/>
+          </a:stretch>
+        </p:blipFill>
+        <p:spPr>
+          <a:xfrm>
+            <a:off x="3472665" y="71919"/>
+            <a:ext cx="5294725" cy="4828854"/>
           </a:xfrm>
           <a:prstGeom prst="rect">
             <a:avLst/>
           </a:prstGeom>
-        </p:spPr>
-        <p:txBody>
-          <a:bodyPr wrap="square" lIns="91425" tIns="91425" rIns="91425" bIns="91425" anchor="t" anchorCtr="0">
-            <a:noAutofit/>
-          </a:bodyPr>
-          <a:lstStyle/>
-          <a:p>
-            <a:pPr lvl="0">
-              <a:spcBef>
-                <a:spcPts val="0"/>
-              </a:spcBef>
-              <a:buNone/>
-            </a:pPr>
-            <a:r>
-              <a:rPr lang="en"/>
-              <a:t>TODO : Add Flow Diagram</a:t>
-            </a:r>
-          </a:p>
-        </p:txBody>
-      </p:sp>
+          <a:ln>
+            <a:noFill/>
+          </a:ln>
+          <a:effectLst>
+            <a:outerShdw blurRad="292100" dist="139700" dir="2700000" algn="tl" rotWithShape="0">
+              <a:srgbClr val="333333">
+                <a:alpha val="65000"/>
+              </a:srgbClr>
+            </a:outerShdw>
+          </a:effectLst>
+        </p:spPr>
+      </p:pic>
     </p:spTree>
   </p:cSld>
   <p:clrMapOvr>
@@ -15560,15 +15922,125 @@
           </a:bodyPr>
           <a:lstStyle/>
           <a:p>
+            <a:pPr marL="228600" lvl="0" indent="-228600">
+              <a:buAutoNum type="arabicPeriod"/>
+            </a:pPr>
+            <a:r>
+              <a:rPr lang="en-US" sz="1400" b="1" dirty="0" smtClean="0"/>
+              <a:t>Noise </a:t>
+            </a:r>
+            <a:r>
+              <a:rPr lang="en-US" sz="1400" b="1" dirty="0"/>
+              <a:t>Removal </a:t>
+            </a:r>
+            <a:r>
+              <a:rPr lang="en-US" sz="1400" dirty="0"/>
+              <a:t>- Any piece of text which is not relevant to the context of the data and the end-output can be specified as the noise. Ex : Stop words etc</a:t>
+            </a:r>
+            <a:r>
+              <a:rPr lang="en-US" sz="1400" dirty="0" smtClean="0"/>
+              <a:t>.</a:t>
+            </a:r>
+          </a:p>
+          <a:p>
+            <a:pPr marL="228600" indent="-228600">
+              <a:buFont typeface="Roboto"/>
+              <a:buAutoNum type="arabicPeriod"/>
+            </a:pPr>
+            <a:r>
+              <a:rPr lang="en-US" sz="1400" b="1" dirty="0"/>
+              <a:t>Lexicon Normalization </a:t>
+            </a:r>
+            <a:r>
+              <a:rPr lang="en-US" sz="1400" dirty="0"/>
+              <a:t>- Normalization is a pivotal step which converts the high dimensional features (N different features) to the low dimensional space (1 </a:t>
+            </a:r>
+            <a:r>
+              <a:rPr lang="en-US" sz="1400" dirty="0" smtClean="0"/>
+              <a:t>feature).</a:t>
+            </a:r>
+          </a:p>
+          <a:p>
             <a:pPr lvl="0">
-              <a:spcBef>
-                <a:spcPts val="0"/>
-              </a:spcBef>
               <a:buNone/>
             </a:pPr>
             <a:r>
-              <a:rPr lang="en"/>
-              <a:t>TODO : NLP Techniques - Bag of Words, n-grams, tf-idf, POS tagging, word stemming etc.</a:t>
+              <a:rPr lang="en-US" sz="1400" dirty="0" smtClean="0"/>
+              <a:t>       a. </a:t>
+            </a:r>
+            <a:r>
+              <a:rPr lang="en-US" sz="1400" b="1" dirty="0" smtClean="0"/>
+              <a:t>Stemming</a:t>
+            </a:r>
+            <a:r>
+              <a:rPr lang="en-US" sz="1400" dirty="0" smtClean="0"/>
+              <a:t> - It is a rudimentary rule-based process of stripping the suffixes (“</a:t>
+            </a:r>
+            <a:r>
+              <a:rPr lang="en-US" sz="1400" dirty="0" err="1" smtClean="0"/>
+              <a:t>ing</a:t>
+            </a:r>
+            <a:r>
+              <a:rPr lang="en-US" sz="1400" dirty="0" smtClean="0"/>
+              <a:t>”, “</a:t>
+            </a:r>
+            <a:r>
+              <a:rPr lang="en-US" sz="1400" dirty="0" err="1" smtClean="0"/>
+              <a:t>ly</a:t>
+            </a:r>
+            <a:r>
+              <a:rPr lang="en-US" sz="1400" dirty="0" smtClean="0"/>
+              <a:t>”, “</a:t>
+            </a:r>
+            <a:r>
+              <a:rPr lang="en-US" sz="1400" dirty="0" err="1" smtClean="0"/>
+              <a:t>es</a:t>
+            </a:r>
+            <a:r>
+              <a:rPr lang="en-US" sz="1400" dirty="0" smtClean="0"/>
+              <a:t>”, “s” </a:t>
+            </a:r>
+            <a:r>
+              <a:rPr lang="en-US" sz="1400" dirty="0" err="1" smtClean="0"/>
+              <a:t>etc</a:t>
+            </a:r>
+            <a:r>
+              <a:rPr lang="en-US" sz="1400" dirty="0" smtClean="0"/>
+              <a:t>)  	             from a word.</a:t>
+            </a:r>
+          </a:p>
+          <a:p>
+            <a:pPr>
+              <a:buNone/>
+            </a:pPr>
+            <a:r>
+              <a:rPr lang="en-US" sz="1400" dirty="0" smtClean="0"/>
+              <a:t>       b. </a:t>
+            </a:r>
+            <a:r>
+              <a:rPr lang="en-US" sz="1400" b="1" dirty="0"/>
+              <a:t>Lemmatization</a:t>
+            </a:r>
+            <a:r>
+              <a:rPr lang="en-US" sz="1400" dirty="0"/>
+              <a:t> - It is an organized &amp; step by step procedure of obtaining the root form of the </a:t>
+            </a:r>
+            <a:r>
+              <a:rPr lang="en-US" sz="1400" dirty="0" smtClean="0"/>
+              <a:t>word.</a:t>
+            </a:r>
+          </a:p>
+          <a:p>
+            <a:pPr lvl="0">
+              <a:buNone/>
+            </a:pPr>
+            <a:r>
+              <a:rPr lang="en-US" sz="1400" b="1" dirty="0" smtClean="0"/>
+              <a:t>3.  Object Standardization </a:t>
+            </a:r>
+            <a:r>
+              <a:rPr lang="en-US" sz="1400" dirty="0" smtClean="0"/>
+              <a:t>– Example – Removing colloquial slangs from tweets  etc.</a:t>
             </a:r>
           </a:p>
         </p:txBody>

</xml_diff>

<commit_message>
Changes ppt, submitted report
</commit_message>
<xml_diff>
--- a/presentation/Mid_Term.pptx
+++ b/presentation/Mid_Term.pptx
@@ -8677,7 +8677,7 @@
                         <a:buNone/>
                       </a:pPr>
                       <a:r>
-                        <a:rPr lang="en" b="1"/>
+                        <a:rPr lang="en" b="1" dirty="0"/>
                         <a:t>Accuracy</a:t>
                       </a:r>
                     </a:p>
@@ -8923,7 +8923,7 @@
               <a:buChar char="●"/>
             </a:pPr>
             <a:r>
-              <a:rPr lang="en"/>
+              <a:rPr lang="en" dirty="0" smtClean="0"/>
               <a:t>Designing and Implementing the Sentiment Analysis Model</a:t>
             </a:r>
           </a:p>
@@ -8935,7 +8935,7 @@
               <a:buChar char="●"/>
             </a:pPr>
             <a:r>
-              <a:rPr lang="en"/>
+              <a:rPr lang="en" dirty="0" smtClean="0"/>
               <a:t>Collecting Social Media Data</a:t>
             </a:r>
           </a:p>
@@ -8947,7 +8947,7 @@
               <a:buChar char="●"/>
             </a:pPr>
             <a:r>
-              <a:rPr lang="en"/>
+              <a:rPr lang="en" dirty="0" smtClean="0"/>
               <a:t>Incorporating other types of data : Financial News and Social Media Data</a:t>
             </a:r>
           </a:p>
@@ -8959,7 +8959,7 @@
               <a:buChar char="●"/>
             </a:pPr>
             <a:r>
-              <a:rPr lang="en"/>
+              <a:rPr lang="en" dirty="0" smtClean="0"/>
               <a:t>Using other financial market parameters like commodities, company stocks etc.</a:t>
             </a:r>
           </a:p>
@@ -8971,9 +8971,13 @@
               <a:buChar char="●"/>
             </a:pPr>
             <a:r>
-              <a:rPr lang="en"/>
-              <a:t>Tackling the effect of news sentiment on (T+1) day.</a:t>
+              <a:rPr lang="en" dirty="0" smtClean="0"/>
+              <a:t>Tackling </a:t>
             </a:r>
+            <a:r>
+              <a:rPr lang="en" dirty="0"/>
+              <a:t>the effect of news sentiment on (T+1) day.</a:t>
+            </a:r>
           </a:p>
           <a:p>
             <a:pPr lvl="0" rtl="0">
@@ -8982,7 +8986,7 @@
               </a:spcBef>
               <a:buNone/>
             </a:pPr>
-            <a:endParaRPr/>
+            <a:endParaRPr dirty="0"/>
           </a:p>
           <a:p>
             <a:pPr lvl="0" rtl="0">
@@ -8991,7 +8995,7 @@
               </a:spcBef>
               <a:buNone/>
             </a:pPr>
-            <a:endParaRPr/>
+            <a:endParaRPr dirty="0"/>
           </a:p>
         </p:txBody>
       </p:sp>
@@ -11619,6 +11623,19 @@
           </a:bodyPr>
           <a:lstStyle/>
           <a:p>
+            <a:pPr>
+              <a:buNone/>
+            </a:pPr>
+            <a:r>
+              <a:rPr lang="en" dirty="0"/>
+              <a:t>Financial market analysis on the basis of financial news and social media data has drawn a lot of attention recently. </a:t>
+            </a:r>
+            <a:r>
+              <a:rPr lang="en-US" dirty="0"/>
+              <a:t>The objective of this study is to develop a market sentiment model based on news and social media data for financial markets using machine learning and see its impact on various financial market indicators like market indices, trading volumes, market volatility etc.</a:t>
+            </a:r>
+          </a:p>
+          <a:p>
             <a:pPr lvl="0">
               <a:spcBef>
                 <a:spcPts val="0"/>
@@ -11626,9 +11643,13 @@
               <a:buNone/>
             </a:pPr>
             <a:r>
-              <a:rPr lang="en"/>
-              <a:t>Financial market analysis on the basis of financial news and social media data has drawn a lot of attention recently. The objective of this study is to develop a market sentiment model for financial markets using machine learning and see its impact on various financial market indicators.</a:t>
+              <a:rPr lang="en" dirty="0" smtClean="0"/>
+              <a:t>Due </a:t>
             </a:r>
+            <a:r>
+              <a:rPr lang="en" dirty="0"/>
+              <a:t>to the volatility of the financial market, price fluctuations based on news reports and social media sentiment are common. Traders draw upon a wide variety of publicly-available information to inform their market decisions.</a:t>
+            </a:r>
           </a:p>
           <a:p>
             <a:pPr lvl="0">
@@ -11637,10 +11658,7 @@
               </a:spcBef>
               <a:buNone/>
             </a:pPr>
-            <a:r>
-              <a:rPr lang="en"/>
-              <a:t>Due to the volatility of the financial market, price fluctuations based on news reports and social media sentiment are common. Traders draw upon a wide variety of publicly-available information to inform their market decisions.</a:t>
-            </a:r>
+            <a:endParaRPr dirty="0"/>
           </a:p>
           <a:p>
             <a:pPr lvl="0">
@@ -11649,16 +11667,7 @@
               </a:spcBef>
               <a:buNone/>
             </a:pPr>
-            <a:endParaRPr/>
-          </a:p>
-          <a:p>
-            <a:pPr lvl="0">
-              <a:spcBef>
-                <a:spcPts val="0"/>
-              </a:spcBef>
-              <a:buNone/>
-            </a:pPr>
-            <a:endParaRPr/>
+            <a:endParaRPr dirty="0"/>
           </a:p>
         </p:txBody>
       </p:sp>
@@ -15239,34 +15248,34 @@
               <a:buChar char="●"/>
             </a:pPr>
             <a:r>
-              <a:rPr lang="en"/>
+              <a:rPr lang="en" dirty="0"/>
               <a:t>Reddit News Dataset : </a:t>
             </a:r>
             <a:br>
-              <a:rPr lang="en"/>
+              <a:rPr lang="en" dirty="0"/>
             </a:br>
             <a:r>
-              <a:rPr lang="en" sz="1200"/>
+              <a:rPr lang="en" sz="1200" dirty="0"/>
               <a:t>Period : 2008 - 2016</a:t>
             </a:r>
             <a:br>
-              <a:rPr lang="en" sz="1200"/>
+              <a:rPr lang="en" sz="1200" dirty="0"/>
             </a:br>
             <a:r>
-              <a:rPr lang="en" sz="1200"/>
+              <a:rPr lang="en" sz="1200" dirty="0"/>
               <a:t>Type of Data : Headlines</a:t>
             </a:r>
             <a:br>
-              <a:rPr lang="en" sz="1200"/>
+              <a:rPr lang="en" sz="1200" dirty="0"/>
             </a:br>
             <a:r>
-              <a:rPr lang="en" sz="1200"/>
+              <a:rPr lang="en" sz="1200" dirty="0"/>
               <a:t>Volume : ~ Top 25 daily (Nearly 74,000) </a:t>
             </a:r>
             <a:br>
-              <a:rPr lang="en" sz="1200"/>
+              <a:rPr lang="en" sz="1200" dirty="0"/>
             </a:br>
-            <a:endParaRPr lang="en" sz="1200"/>
+            <a:endParaRPr lang="en" sz="1200" dirty="0"/>
           </a:p>
           <a:p>
             <a:pPr marL="457200" lvl="0" indent="-228600" rtl="0">
@@ -15276,42 +15285,50 @@
               <a:buChar char="●"/>
             </a:pPr>
             <a:r>
-              <a:rPr lang="en"/>
-              <a:t>New York Times Archive :</a:t>
+              <a:rPr lang="en" dirty="0"/>
+              <a:t>New York </a:t>
+            </a:r>
+            <a:r>
+              <a:rPr lang="en" dirty="0" smtClean="0"/>
+              <a:t>Times Dataset </a:t>
+            </a:r>
+            <a:r>
+              <a:rPr lang="en" dirty="0"/>
+              <a:t>:</a:t>
             </a:r>
             <a:br>
-              <a:rPr lang="en"/>
+              <a:rPr lang="en" dirty="0"/>
             </a:br>
             <a:r>
-              <a:rPr lang="en" sz="1200"/>
+              <a:rPr lang="en" sz="1200" dirty="0"/>
               <a:t>(Created our own data collection model) </a:t>
             </a:r>
             <a:br>
-              <a:rPr lang="en" sz="1200"/>
+              <a:rPr lang="en" sz="1200" dirty="0"/>
             </a:br>
             <a:r>
-              <a:rPr lang="en" sz="1200"/>
+              <a:rPr lang="en" sz="1200" dirty="0"/>
               <a:t>Period : 2008 - 2016</a:t>
             </a:r>
             <a:br>
-              <a:rPr lang="en" sz="1200"/>
+              <a:rPr lang="en" sz="1200" dirty="0"/>
             </a:br>
             <a:r>
-              <a:rPr lang="en" sz="1200"/>
+              <a:rPr lang="en" sz="1200" dirty="0"/>
               <a:t>Type of Data : Headlines and News Articles</a:t>
             </a:r>
             <a:br>
-              <a:rPr lang="en" sz="1200"/>
+              <a:rPr lang="en" sz="1200" dirty="0"/>
             </a:br>
             <a:r>
-              <a:rPr lang="en" sz="1200"/>
+              <a:rPr lang="en" sz="1200" dirty="0"/>
               <a:t>Volume : 1. World News : 3800 per month</a:t>
             </a:r>
             <a:br>
-              <a:rPr lang="en" sz="1200"/>
+              <a:rPr lang="en" sz="1200" dirty="0"/>
             </a:br>
             <a:r>
-              <a:rPr lang="en" sz="1200"/>
+              <a:rPr lang="en" sz="1200" dirty="0"/>
               <a:t>	     2. Financial News : 1000 per month  </a:t>
             </a:r>
           </a:p>
@@ -15657,7 +15674,7 @@
               <a:buNone/>
             </a:pPr>
             <a:r>
-              <a:rPr lang="en"/>
+              <a:rPr lang="en" dirty="0"/>
               <a:t>The Dow Jones Industrial Average (DJIA) is a stock market index, and one of several indices created by Wall Street Journal editor and Dow Jones &amp; Company co-founder Charles Dow. The industrial average was first calculated on May 26, 1896.</a:t>
             </a:r>
           </a:p>
@@ -15669,7 +15686,7 @@
               <a:buNone/>
             </a:pPr>
             <a:r>
-              <a:rPr lang="en"/>
+              <a:rPr lang="en" dirty="0"/>
               <a:t>It is an index that shows how 30 large publicly owned companies based in the United States have traded during a standard trading session in the stock market.</a:t>
             </a:r>
           </a:p>
@@ -15680,7 +15697,7 @@
               </a:spcBef>
               <a:buNone/>
             </a:pPr>
-            <a:endParaRPr/>
+            <a:endParaRPr dirty="0"/>
           </a:p>
         </p:txBody>
       </p:sp>

</xml_diff>

<commit_message>
PPT Completed - Sentiment Slides Added
</commit_message>
<xml_diff>
--- a/presentation/Mid_Term.pptx
+++ b/presentation/Mid_Term.pptx
@@ -5,7 +5,7 @@
     <p:sldMasterId id="2147483659" r:id="rId1"/>
   </p:sldMasterIdLst>
   <p:notesMasterIdLst>
-    <p:notesMasterId r:id="rId23"/>
+    <p:notesMasterId r:id="rId24"/>
   </p:notesMasterIdLst>
   <p:sldIdLst>
     <p:sldId id="256" r:id="rId2"/>
@@ -19,40 +19,41 @@
     <p:sldId id="264" r:id="rId10"/>
     <p:sldId id="276" r:id="rId11"/>
     <p:sldId id="265" r:id="rId12"/>
-    <p:sldId id="266" r:id="rId13"/>
-    <p:sldId id="267" r:id="rId14"/>
-    <p:sldId id="268" r:id="rId15"/>
-    <p:sldId id="269" r:id="rId16"/>
-    <p:sldId id="270" r:id="rId17"/>
-    <p:sldId id="271" r:id="rId18"/>
-    <p:sldId id="272" r:id="rId19"/>
-    <p:sldId id="273" r:id="rId20"/>
-    <p:sldId id="274" r:id="rId21"/>
-    <p:sldId id="275" r:id="rId22"/>
+    <p:sldId id="277" r:id="rId13"/>
+    <p:sldId id="266" r:id="rId14"/>
+    <p:sldId id="267" r:id="rId15"/>
+    <p:sldId id="268" r:id="rId16"/>
+    <p:sldId id="269" r:id="rId17"/>
+    <p:sldId id="270" r:id="rId18"/>
+    <p:sldId id="271" r:id="rId19"/>
+    <p:sldId id="272" r:id="rId20"/>
+    <p:sldId id="273" r:id="rId21"/>
+    <p:sldId id="274" r:id="rId22"/>
+    <p:sldId id="275" r:id="rId23"/>
   </p:sldIdLst>
   <p:sldSz cx="9144000" cy="5143500" type="screen16x9"/>
   <p:notesSz cx="6858000" cy="9144000"/>
   <p:embeddedFontLst>
     <p:embeddedFont>
       <p:font typeface="Raleway" panose="020B0604020202020204" charset="0"/>
-      <p:regular r:id="rId24"/>
-      <p:bold r:id="rId25"/>
-      <p:italic r:id="rId26"/>
-      <p:boldItalic r:id="rId27"/>
+      <p:regular r:id="rId25"/>
+      <p:bold r:id="rId26"/>
+      <p:italic r:id="rId27"/>
+      <p:boldItalic r:id="rId28"/>
     </p:embeddedFont>
     <p:embeddedFont>
       <p:font typeface="Roboto" panose="020B0604020202020204" charset="0"/>
-      <p:regular r:id="rId28"/>
-      <p:bold r:id="rId29"/>
-      <p:italic r:id="rId30"/>
-      <p:boldItalic r:id="rId31"/>
+      <p:regular r:id="rId29"/>
+      <p:bold r:id="rId30"/>
+      <p:italic r:id="rId31"/>
+      <p:boldItalic r:id="rId32"/>
     </p:embeddedFont>
     <p:embeddedFont>
       <p:font typeface="Lato" panose="020B0604020202020204" charset="0"/>
-      <p:regular r:id="rId32"/>
-      <p:bold r:id="rId33"/>
-      <p:italic r:id="rId34"/>
-      <p:boldItalic r:id="rId35"/>
+      <p:regular r:id="rId33"/>
+      <p:bold r:id="rId34"/>
+      <p:italic r:id="rId35"/>
+      <p:boldItalic r:id="rId36"/>
     </p:embeddedFont>
   </p:embeddedFontLst>
   <p:defaultTextStyle>
@@ -859,7 +860,7 @@
   <p:cSld>
     <p:spTree>
       <p:nvGrpSpPr>
-        <p:cNvPr id="1" name="Shape 143"/>
+        <p:cNvPr id="1" name="Shape 137"/>
         <p:cNvGrpSpPr/>
         <p:nvPr/>
       </p:nvGrpSpPr>
@@ -873,7 +874,7 @@
       </p:grpSpPr>
       <p:sp>
         <p:nvSpPr>
-          <p:cNvPr id="144" name="Shape 144"/>
+          <p:cNvPr id="138" name="Shape 138"/>
           <p:cNvSpPr>
             <a:spLocks noGrp="1" noRot="1" noChangeAspect="1"/>
           </p:cNvSpPr>
@@ -914,7 +915,7 @@
       </p:sp>
       <p:sp>
         <p:nvSpPr>
-          <p:cNvPr id="145" name="Shape 145"/>
+          <p:cNvPr id="139" name="Shape 139"/>
           <p:cNvSpPr txBox="1">
             <a:spLocks noGrp="1"/>
           </p:cNvSpPr>
@@ -937,7 +938,7 @@
           </a:bodyPr>
           <a:lstStyle/>
           <a:p>
-            <a:pPr lvl="0" rtl="0">
+            <a:pPr lvl="0">
               <a:spcBef>
                 <a:spcPts val="0"/>
               </a:spcBef>
@@ -950,7 +951,7 @@
     </p:spTree>
     <p:extLst>
       <p:ext uri="{BB962C8B-B14F-4D97-AF65-F5344CB8AC3E}">
-        <p14:creationId xmlns:p14="http://schemas.microsoft.com/office/powerpoint/2010/main" val="2234372423"/>
+        <p14:creationId xmlns:p14="http://schemas.microsoft.com/office/powerpoint/2010/main" val="860423579"/>
       </p:ext>
     </p:extLst>
   </p:cSld>
@@ -965,7 +966,7 @@
   <p:cSld>
     <p:spTree>
       <p:nvGrpSpPr>
-        <p:cNvPr id="1" name="Shape 152"/>
+        <p:cNvPr id="1" name="Shape 143"/>
         <p:cNvGrpSpPr/>
         <p:nvPr/>
       </p:nvGrpSpPr>
@@ -979,7 +980,7 @@
       </p:grpSpPr>
       <p:sp>
         <p:nvSpPr>
-          <p:cNvPr id="153" name="Shape 153"/>
+          <p:cNvPr id="144" name="Shape 144"/>
           <p:cNvSpPr>
             <a:spLocks noGrp="1" noRot="1" noChangeAspect="1"/>
           </p:cNvSpPr>
@@ -1020,7 +1021,7 @@
       </p:sp>
       <p:sp>
         <p:nvSpPr>
-          <p:cNvPr id="154" name="Shape 154"/>
+          <p:cNvPr id="145" name="Shape 145"/>
           <p:cNvSpPr txBox="1">
             <a:spLocks noGrp="1"/>
           </p:cNvSpPr>
@@ -1056,7 +1057,7 @@
     </p:spTree>
     <p:extLst>
       <p:ext uri="{BB962C8B-B14F-4D97-AF65-F5344CB8AC3E}">
-        <p14:creationId xmlns:p14="http://schemas.microsoft.com/office/powerpoint/2010/main" val="3748156321"/>
+        <p14:creationId xmlns:p14="http://schemas.microsoft.com/office/powerpoint/2010/main" val="2234372423"/>
       </p:ext>
     </p:extLst>
   </p:cSld>
@@ -1071,7 +1072,7 @@
   <p:cSld>
     <p:spTree>
       <p:nvGrpSpPr>
-        <p:cNvPr id="1" name="Shape 158"/>
+        <p:cNvPr id="1" name="Shape 152"/>
         <p:cNvGrpSpPr/>
         <p:nvPr/>
       </p:nvGrpSpPr>
@@ -1085,7 +1086,7 @@
       </p:grpSpPr>
       <p:sp>
         <p:nvSpPr>
-          <p:cNvPr id="159" name="Shape 159"/>
+          <p:cNvPr id="153" name="Shape 153"/>
           <p:cNvSpPr>
             <a:spLocks noGrp="1" noRot="1" noChangeAspect="1"/>
           </p:cNvSpPr>
@@ -1126,7 +1127,7 @@
       </p:sp>
       <p:sp>
         <p:nvSpPr>
-          <p:cNvPr id="160" name="Shape 160"/>
+          <p:cNvPr id="154" name="Shape 154"/>
           <p:cNvSpPr txBox="1">
             <a:spLocks noGrp="1"/>
           </p:cNvSpPr>
@@ -1149,7 +1150,7 @@
           </a:bodyPr>
           <a:lstStyle/>
           <a:p>
-            <a:pPr lvl="0">
+            <a:pPr lvl="0" rtl="0">
               <a:spcBef>
                 <a:spcPts val="0"/>
               </a:spcBef>
@@ -1162,7 +1163,7 @@
     </p:spTree>
     <p:extLst>
       <p:ext uri="{BB962C8B-B14F-4D97-AF65-F5344CB8AC3E}">
-        <p14:creationId xmlns:p14="http://schemas.microsoft.com/office/powerpoint/2010/main" val="2794943945"/>
+        <p14:creationId xmlns:p14="http://schemas.microsoft.com/office/powerpoint/2010/main" val="3748156321"/>
       </p:ext>
     </p:extLst>
   </p:cSld>
@@ -1177,7 +1178,7 @@
   <p:cSld>
     <p:spTree>
       <p:nvGrpSpPr>
-        <p:cNvPr id="1" name="Shape 163"/>
+        <p:cNvPr id="1" name="Shape 158"/>
         <p:cNvGrpSpPr/>
         <p:nvPr/>
       </p:nvGrpSpPr>
@@ -1191,7 +1192,7 @@
       </p:grpSpPr>
       <p:sp>
         <p:nvSpPr>
-          <p:cNvPr id="164" name="Shape 164"/>
+          <p:cNvPr id="159" name="Shape 159"/>
           <p:cNvSpPr>
             <a:spLocks noGrp="1" noRot="1" noChangeAspect="1"/>
           </p:cNvSpPr>
@@ -1232,7 +1233,7 @@
       </p:sp>
       <p:sp>
         <p:nvSpPr>
-          <p:cNvPr id="165" name="Shape 165"/>
+          <p:cNvPr id="160" name="Shape 160"/>
           <p:cNvSpPr txBox="1">
             <a:spLocks noGrp="1"/>
           </p:cNvSpPr>
@@ -1268,7 +1269,7 @@
     </p:spTree>
     <p:extLst>
       <p:ext uri="{BB962C8B-B14F-4D97-AF65-F5344CB8AC3E}">
-        <p14:creationId xmlns:p14="http://schemas.microsoft.com/office/powerpoint/2010/main" val="2392235288"/>
+        <p14:creationId xmlns:p14="http://schemas.microsoft.com/office/powerpoint/2010/main" val="2794943945"/>
       </p:ext>
     </p:extLst>
   </p:cSld>
@@ -1283,7 +1284,7 @@
   <p:cSld>
     <p:spTree>
       <p:nvGrpSpPr>
-        <p:cNvPr id="1" name="Shape 183"/>
+        <p:cNvPr id="1" name="Shape 163"/>
         <p:cNvGrpSpPr/>
         <p:nvPr/>
       </p:nvGrpSpPr>
@@ -1297,7 +1298,7 @@
       </p:grpSpPr>
       <p:sp>
         <p:nvSpPr>
-          <p:cNvPr id="184" name="Shape 184"/>
+          <p:cNvPr id="164" name="Shape 164"/>
           <p:cNvSpPr>
             <a:spLocks noGrp="1" noRot="1" noChangeAspect="1"/>
           </p:cNvSpPr>
@@ -1338,7 +1339,7 @@
       </p:sp>
       <p:sp>
         <p:nvSpPr>
-          <p:cNvPr id="185" name="Shape 185"/>
+          <p:cNvPr id="165" name="Shape 165"/>
           <p:cNvSpPr txBox="1">
             <a:spLocks noGrp="1"/>
           </p:cNvSpPr>
@@ -1374,7 +1375,7 @@
     </p:spTree>
     <p:extLst>
       <p:ext uri="{BB962C8B-B14F-4D97-AF65-F5344CB8AC3E}">
-        <p14:creationId xmlns:p14="http://schemas.microsoft.com/office/powerpoint/2010/main" val="2832199068"/>
+        <p14:creationId xmlns:p14="http://schemas.microsoft.com/office/powerpoint/2010/main" val="2392235288"/>
       </p:ext>
     </p:extLst>
   </p:cSld>
@@ -1389,7 +1390,7 @@
   <p:cSld>
     <p:spTree>
       <p:nvGrpSpPr>
-        <p:cNvPr id="1" name="Shape 197"/>
+        <p:cNvPr id="1" name="Shape 183"/>
         <p:cNvGrpSpPr/>
         <p:nvPr/>
       </p:nvGrpSpPr>
@@ -1403,7 +1404,7 @@
       </p:grpSpPr>
       <p:sp>
         <p:nvSpPr>
-          <p:cNvPr id="198" name="Shape 198"/>
+          <p:cNvPr id="184" name="Shape 184"/>
           <p:cNvSpPr>
             <a:spLocks noGrp="1" noRot="1" noChangeAspect="1"/>
           </p:cNvSpPr>
@@ -1444,7 +1445,7 @@
       </p:sp>
       <p:sp>
         <p:nvSpPr>
-          <p:cNvPr id="199" name="Shape 199"/>
+          <p:cNvPr id="185" name="Shape 185"/>
           <p:cNvSpPr txBox="1">
             <a:spLocks noGrp="1"/>
           </p:cNvSpPr>
@@ -1480,7 +1481,7 @@
     </p:spTree>
     <p:extLst>
       <p:ext uri="{BB962C8B-B14F-4D97-AF65-F5344CB8AC3E}">
-        <p14:creationId xmlns:p14="http://schemas.microsoft.com/office/powerpoint/2010/main" val="582289305"/>
+        <p14:creationId xmlns:p14="http://schemas.microsoft.com/office/powerpoint/2010/main" val="2832199068"/>
       </p:ext>
     </p:extLst>
   </p:cSld>
@@ -1495,7 +1496,7 @@
   <p:cSld>
     <p:spTree>
       <p:nvGrpSpPr>
-        <p:cNvPr id="1" name="Shape 204"/>
+        <p:cNvPr id="1" name="Shape 197"/>
         <p:cNvGrpSpPr/>
         <p:nvPr/>
       </p:nvGrpSpPr>
@@ -1509,7 +1510,7 @@
       </p:grpSpPr>
       <p:sp>
         <p:nvSpPr>
-          <p:cNvPr id="205" name="Shape 205"/>
+          <p:cNvPr id="198" name="Shape 198"/>
           <p:cNvSpPr>
             <a:spLocks noGrp="1" noRot="1" noChangeAspect="1"/>
           </p:cNvSpPr>
@@ -1550,7 +1551,7 @@
       </p:sp>
       <p:sp>
         <p:nvSpPr>
-          <p:cNvPr id="206" name="Shape 206"/>
+          <p:cNvPr id="199" name="Shape 199"/>
           <p:cNvSpPr txBox="1">
             <a:spLocks noGrp="1"/>
           </p:cNvSpPr>
@@ -1586,7 +1587,7 @@
     </p:spTree>
     <p:extLst>
       <p:ext uri="{BB962C8B-B14F-4D97-AF65-F5344CB8AC3E}">
-        <p14:creationId xmlns:p14="http://schemas.microsoft.com/office/powerpoint/2010/main" val="1980633293"/>
+        <p14:creationId xmlns:p14="http://schemas.microsoft.com/office/powerpoint/2010/main" val="582289305"/>
       </p:ext>
     </p:extLst>
   </p:cSld>
@@ -1601,7 +1602,7 @@
   <p:cSld>
     <p:spTree>
       <p:nvGrpSpPr>
-        <p:cNvPr id="1" name="Shape 209"/>
+        <p:cNvPr id="1" name="Shape 204"/>
         <p:cNvGrpSpPr/>
         <p:nvPr/>
       </p:nvGrpSpPr>
@@ -1615,7 +1616,7 @@
       </p:grpSpPr>
       <p:sp>
         <p:nvSpPr>
-          <p:cNvPr id="210" name="Shape 210"/>
+          <p:cNvPr id="205" name="Shape 205"/>
           <p:cNvSpPr>
             <a:spLocks noGrp="1" noRot="1" noChangeAspect="1"/>
           </p:cNvSpPr>
@@ -1656,7 +1657,7 @@
       </p:sp>
       <p:sp>
         <p:nvSpPr>
-          <p:cNvPr id="211" name="Shape 211"/>
+          <p:cNvPr id="206" name="Shape 206"/>
           <p:cNvSpPr txBox="1">
             <a:spLocks noGrp="1"/>
           </p:cNvSpPr>
@@ -1692,7 +1693,7 @@
     </p:spTree>
     <p:extLst>
       <p:ext uri="{BB962C8B-B14F-4D97-AF65-F5344CB8AC3E}">
-        <p14:creationId xmlns:p14="http://schemas.microsoft.com/office/powerpoint/2010/main" val="3114136405"/>
+        <p14:creationId xmlns:p14="http://schemas.microsoft.com/office/powerpoint/2010/main" val="1980633293"/>
       </p:ext>
     </p:extLst>
   </p:cSld>
@@ -1813,7 +1814,7 @@
   <p:cSld>
     <p:spTree>
       <p:nvGrpSpPr>
-        <p:cNvPr id="1" name="Shape 243"/>
+        <p:cNvPr id="1" name="Shape 209"/>
         <p:cNvGrpSpPr/>
         <p:nvPr/>
       </p:nvGrpSpPr>
@@ -1827,7 +1828,7 @@
       </p:grpSpPr>
       <p:sp>
         <p:nvSpPr>
-          <p:cNvPr id="244" name="Shape 244"/>
+          <p:cNvPr id="210" name="Shape 210"/>
           <p:cNvSpPr>
             <a:spLocks noGrp="1" noRot="1" noChangeAspect="1"/>
           </p:cNvSpPr>
@@ -1868,6 +1869,112 @@
       </p:sp>
       <p:sp>
         <p:nvSpPr>
+          <p:cNvPr id="211" name="Shape 211"/>
+          <p:cNvSpPr txBox="1">
+            <a:spLocks noGrp="1"/>
+          </p:cNvSpPr>
+          <p:nvPr>
+            <p:ph type="body" idx="1"/>
+          </p:nvPr>
+        </p:nvSpPr>
+        <p:spPr>
+          <a:xfrm>
+            <a:off x="685800" y="4343400"/>
+            <a:ext cx="5486400" cy="4114800"/>
+          </a:xfrm>
+          <a:prstGeom prst="rect">
+            <a:avLst/>
+          </a:prstGeom>
+        </p:spPr>
+        <p:txBody>
+          <a:bodyPr wrap="square" lIns="91425" tIns="91425" rIns="91425" bIns="91425" anchor="t" anchorCtr="0">
+            <a:noAutofit/>
+          </a:bodyPr>
+          <a:lstStyle/>
+          <a:p>
+            <a:pPr lvl="0">
+              <a:spcBef>
+                <a:spcPts val="0"/>
+              </a:spcBef>
+              <a:buNone/>
+            </a:pPr>
+            <a:endParaRPr/>
+          </a:p>
+        </p:txBody>
+      </p:sp>
+    </p:spTree>
+    <p:extLst>
+      <p:ext uri="{BB962C8B-B14F-4D97-AF65-F5344CB8AC3E}">
+        <p14:creationId xmlns:p14="http://schemas.microsoft.com/office/powerpoint/2010/main" val="3114136405"/>
+      </p:ext>
+    </p:extLst>
+  </p:cSld>
+  <p:clrMapOvr>
+    <a:masterClrMapping/>
+  </p:clrMapOvr>
+</p:notes>
+</file>
+
+<file path=ppt/notesSlides/notesSlide21.xml><?xml version="1.0" encoding="utf-8"?>
+<p:notes xmlns:a="http://schemas.openxmlformats.org/drawingml/2006/main" xmlns:r="http://schemas.openxmlformats.org/officeDocument/2006/relationships" xmlns:p="http://schemas.openxmlformats.org/presentationml/2006/main" showMasterSp="0" showMasterPhAnim="0">
+  <p:cSld>
+    <p:spTree>
+      <p:nvGrpSpPr>
+        <p:cNvPr id="1" name="Shape 243"/>
+        <p:cNvGrpSpPr/>
+        <p:nvPr/>
+      </p:nvGrpSpPr>
+      <p:grpSpPr>
+        <a:xfrm>
+          <a:off x="0" y="0"/>
+          <a:ext cx="0" cy="0"/>
+          <a:chOff x="0" y="0"/>
+          <a:chExt cx="0" cy="0"/>
+        </a:xfrm>
+      </p:grpSpPr>
+      <p:sp>
+        <p:nvSpPr>
+          <p:cNvPr id="244" name="Shape 244"/>
+          <p:cNvSpPr>
+            <a:spLocks noGrp="1" noRot="1" noChangeAspect="1"/>
+          </p:cNvSpPr>
+          <p:nvPr>
+            <p:ph type="sldImg" idx="2"/>
+          </p:nvPr>
+        </p:nvSpPr>
+        <p:spPr>
+          <a:xfrm>
+            <a:off x="381000" y="685800"/>
+            <a:ext cx="6096000" cy="3429000"/>
+          </a:xfrm>
+          <a:custGeom>
+            <a:avLst/>
+            <a:gdLst/>
+            <a:ahLst/>
+            <a:cxnLst/>
+            <a:rect l="0" t="0" r="0" b="0"/>
+            <a:pathLst>
+              <a:path w="120000" h="120000" extrusionOk="0">
+                <a:moveTo>
+                  <a:pt x="0" y="0"/>
+                </a:moveTo>
+                <a:lnTo>
+                  <a:pt x="120000" y="0"/>
+                </a:lnTo>
+                <a:lnTo>
+                  <a:pt x="120000" y="120000"/>
+                </a:lnTo>
+                <a:lnTo>
+                  <a:pt x="0" y="120000"/>
+                </a:lnTo>
+                <a:close/>
+              </a:path>
+            </a:pathLst>
+          </a:custGeom>
+        </p:spPr>
+      </p:sp>
+      <p:sp>
+        <p:nvSpPr>
           <p:cNvPr id="245" name="Shape 245"/>
           <p:cNvSpPr txBox="1">
             <a:spLocks noGrp="1"/>
@@ -1914,7 +2021,7 @@
 </p:notes>
 </file>
 
-<file path=ppt/notesSlides/notesSlide21.xml><?xml version="1.0" encoding="utf-8"?>
+<file path=ppt/notesSlides/notesSlide22.xml><?xml version="1.0" encoding="utf-8"?>
 <p:notes xmlns:a="http://schemas.openxmlformats.org/drawingml/2006/main" xmlns:r="http://schemas.openxmlformats.org/officeDocument/2006/relationships" xmlns:p="http://schemas.openxmlformats.org/presentationml/2006/main" showMasterSp="0" showMasterPhAnim="0">
   <p:cSld>
     <p:spTree>
@@ -8252,15 +8359,41 @@
           <a:lstStyle/>
           <a:p>
             <a:pPr lvl="0">
-              <a:spcBef>
-                <a:spcPts val="0"/>
-              </a:spcBef>
-              <a:buNone/>
-            </a:pPr>
-            <a:r>
-              <a:rPr lang="en"/>
-              <a:t>TODO : To complete ( Probably 2 slides) </a:t>
-            </a:r>
+              <a:buNone/>
+            </a:pPr>
+            <a:r>
+              <a:rPr lang="en-US" sz="1400" dirty="0"/>
+              <a:t>Sentiment analysis refers to a wide range of areas of natural language processing, text mining and computational linguistics</a:t>
+            </a:r>
+            <a:r>
+              <a:rPr lang="en-US" sz="1400" dirty="0" smtClean="0"/>
+              <a:t>. </a:t>
+            </a:r>
+            <a:r>
+              <a:rPr lang="en-US" sz="1400" dirty="0"/>
+              <a:t>The sentiment found within news articles and social media data provide useful indicators for many different purposes</a:t>
+            </a:r>
+            <a:r>
+              <a:rPr lang="en-US" sz="1400" dirty="0" smtClean="0"/>
+              <a:t>.</a:t>
+            </a:r>
+          </a:p>
+          <a:p>
+            <a:pPr lvl="0">
+              <a:buNone/>
+            </a:pPr>
+            <a:r>
+              <a:rPr lang="en-US" sz="1400" dirty="0" smtClean="0"/>
+              <a:t>Some of the basic steps involved are : </a:t>
+            </a:r>
+          </a:p>
+          <a:p>
+            <a:pPr marL="285750" indent="-285750"/>
+            <a:r>
+              <a:rPr lang="en-US" sz="1400" dirty="0"/>
+              <a:t>Generating a Sentiment Dictionary: A new sentiment dictionary would be generated specifically for financial domain sentiment analysis. Example: Words like bear and bull have different meanings in finance than their usual meanings.</a:t>
+            </a:r>
+            <a:endParaRPr lang="en" sz="1400" dirty="0"/>
           </a:p>
         </p:txBody>
       </p:sp>
@@ -8280,6 +8413,241 @@
 </file>
 
 <file path=ppt/slides/slide12.xml><?xml version="1.0" encoding="utf-8"?>
+<p:sld xmlns:a="http://schemas.openxmlformats.org/drawingml/2006/main" xmlns:r="http://schemas.openxmlformats.org/officeDocument/2006/relationships" xmlns:p="http://schemas.openxmlformats.org/presentationml/2006/main">
+  <p:cSld>
+    <p:spTree>
+      <p:nvGrpSpPr>
+        <p:cNvPr id="1" name="Shape 140"/>
+        <p:cNvGrpSpPr/>
+        <p:nvPr/>
+      </p:nvGrpSpPr>
+      <p:grpSpPr>
+        <a:xfrm>
+          <a:off x="0" y="0"/>
+          <a:ext cx="0" cy="0"/>
+          <a:chOff x="0" y="0"/>
+          <a:chExt cx="0" cy="0"/>
+        </a:xfrm>
+      </p:grpSpPr>
+      <p:sp>
+        <p:nvSpPr>
+          <p:cNvPr id="141" name="Shape 141"/>
+          <p:cNvSpPr txBox="1">
+            <a:spLocks noGrp="1"/>
+          </p:cNvSpPr>
+          <p:nvPr>
+            <p:ph type="title"/>
+          </p:nvPr>
+        </p:nvSpPr>
+        <p:spPr>
+          <a:xfrm>
+            <a:off x="311700" y="410000"/>
+            <a:ext cx="8520600" cy="607800"/>
+          </a:xfrm>
+          <a:prstGeom prst="rect">
+            <a:avLst/>
+          </a:prstGeom>
+        </p:spPr>
+        <p:txBody>
+          <a:bodyPr wrap="square" lIns="91425" tIns="91425" rIns="91425" bIns="91425" anchor="t" anchorCtr="0">
+            <a:noAutofit/>
+          </a:bodyPr>
+          <a:lstStyle/>
+          <a:p>
+            <a:pPr lvl="0">
+              <a:spcBef>
+                <a:spcPts val="0"/>
+              </a:spcBef>
+              <a:buNone/>
+            </a:pPr>
+            <a:r>
+              <a:rPr lang="en"/>
+              <a:t>Sentiment Analysis</a:t>
+            </a:r>
+          </a:p>
+        </p:txBody>
+      </p:sp>
+      <p:sp>
+        <p:nvSpPr>
+          <p:cNvPr id="142" name="Shape 142"/>
+          <p:cNvSpPr txBox="1">
+            <a:spLocks noGrp="1"/>
+          </p:cNvSpPr>
+          <p:nvPr>
+            <p:ph type="body" idx="1"/>
+          </p:nvPr>
+        </p:nvSpPr>
+        <p:spPr>
+          <a:xfrm>
+            <a:off x="311700" y="1106586"/>
+            <a:ext cx="8520600" cy="3339000"/>
+          </a:xfrm>
+          <a:prstGeom prst="rect">
+            <a:avLst/>
+          </a:prstGeom>
+        </p:spPr>
+        <p:txBody>
+          <a:bodyPr wrap="square" lIns="91425" tIns="91425" rIns="91425" bIns="91425" anchor="t" anchorCtr="0">
+            <a:noAutofit/>
+          </a:bodyPr>
+          <a:lstStyle/>
+          <a:p>
+            <a:r>
+              <a:rPr lang="en-US" dirty="0" smtClean="0"/>
+              <a:t> </a:t>
+            </a:r>
+            <a:r>
+              <a:rPr lang="en-US" sz="1400" dirty="0" smtClean="0"/>
+              <a:t>Classification</a:t>
+            </a:r>
+            <a:r>
+              <a:rPr lang="en-US" sz="1400" dirty="0"/>
+              <a:t>: There are various classifiers that can be used for sentiment analysis. </a:t>
+            </a:r>
+            <a:r>
+              <a:rPr lang="en" sz="1400" dirty="0"/>
+              <a:t/>
+            </a:r>
+            <a:br>
+              <a:rPr lang="en" sz="1400" dirty="0"/>
+            </a:br>
+            <a:r>
+              <a:rPr lang="en" sz="1400" dirty="0" smtClean="0"/>
+              <a:t>	</a:t>
+            </a:r>
+            <a:r>
+              <a:rPr lang="en-US" sz="1400" dirty="0" smtClean="0"/>
+              <a:t>a. Rule Based Classification : </a:t>
+            </a:r>
+            <a:r>
+              <a:rPr lang="en-US" sz="1400" dirty="0"/>
+              <a:t>A rule consists of an antecedent and </a:t>
+            </a:r>
+            <a:r>
+              <a:rPr lang="en-US" sz="1400" dirty="0" smtClean="0"/>
+              <a:t>its associated consequent    	that </a:t>
+            </a:r>
+            <a:r>
+              <a:rPr lang="en-US" sz="1400" dirty="0"/>
+              <a:t>have an ‘if-then ’relation</a:t>
+            </a:r>
+            <a:r>
+              <a:rPr lang="en-US" sz="1400" dirty="0" smtClean="0"/>
+              <a:t>:	 					antecedent </a:t>
+            </a:r>
+            <a:r>
+              <a:rPr lang="en-US" sz="1400" dirty="0"/>
+              <a:t>=⇒ </a:t>
+            </a:r>
+            <a:r>
+              <a:rPr lang="en-US" sz="1400" dirty="0" smtClean="0"/>
+              <a:t>consequent 						 	For </a:t>
+            </a:r>
+            <a:r>
+              <a:rPr lang="en-US" sz="1400" dirty="0"/>
+              <a:t>Example: Bull =&gt; {positive sentiment i.e. </a:t>
+            </a:r>
+            <a:r>
+              <a:rPr lang="en-US" sz="1400" dirty="0" smtClean="0"/>
+              <a:t>+}					         		    Bear </a:t>
+            </a:r>
+            <a:r>
+              <a:rPr lang="en-US" sz="1400" dirty="0"/>
+              <a:t>=&gt; {negative sentiment i.e., </a:t>
+            </a:r>
+            <a:r>
+              <a:rPr lang="en-US" sz="1400" dirty="0" smtClean="0"/>
+              <a:t>-}</a:t>
+            </a:r>
+            <a:br>
+              <a:rPr lang="en-US" sz="1400" dirty="0" smtClean="0"/>
+            </a:br>
+            <a:r>
+              <a:rPr lang="en-US" sz="1400" dirty="0" smtClean="0"/>
+              <a:t>	b. Support Vector Machines</a:t>
+            </a:r>
+            <a:br>
+              <a:rPr lang="en-US" sz="1400" dirty="0" smtClean="0"/>
+            </a:br>
+            <a:r>
+              <a:rPr lang="en-US" sz="1400" dirty="0" smtClean="0"/>
+              <a:t>	c. Hybrid Classification </a:t>
+            </a:r>
+            <a:br>
+              <a:rPr lang="en-US" sz="1400" dirty="0" smtClean="0"/>
+            </a:br>
+            <a:r>
+              <a:rPr lang="en-US" sz="1400" dirty="0" smtClean="0"/>
+              <a:t>	d. Manual Classification</a:t>
+            </a:r>
+          </a:p>
+          <a:p>
+            <a:pPr marL="285750" indent="-285750"/>
+            <a:r>
+              <a:rPr lang="en-US" sz="1400" dirty="0"/>
+              <a:t>Sentiment Scoring: Sentiment  scores can  be  evaluated  for  each  sentence (for  sentence-based sentiment analysis), for  entire document (for  document-based  sentiment </a:t>
+            </a:r>
+            <a:r>
+              <a:rPr lang="en-US" sz="1400" dirty="0" smtClean="0"/>
+              <a:t/>
+            </a:r>
+            <a:br>
+              <a:rPr lang="en-US" sz="1400" dirty="0" smtClean="0"/>
+            </a:br>
+            <a:r>
+              <a:rPr lang="en-US" sz="1400" dirty="0" smtClean="0"/>
+              <a:t>analysis), or  </a:t>
+            </a:r>
+            <a:r>
+              <a:rPr lang="en-US" sz="1400" dirty="0"/>
+              <a:t>for specific  aspects  of entities  (for  aspect-based  </a:t>
+            </a:r>
+            <a:r>
+              <a:rPr lang="en-US" sz="1400" dirty="0" smtClean="0"/>
+              <a:t>sentiment</a:t>
+            </a:r>
+            <a:br>
+              <a:rPr lang="en-US" sz="1400" dirty="0" smtClean="0"/>
+            </a:br>
+            <a:r>
+              <a:rPr lang="en-US" sz="1400" dirty="0" smtClean="0"/>
+              <a:t>analysis</a:t>
+            </a:r>
+            <a:r>
+              <a:rPr lang="en-US" sz="1400" dirty="0"/>
+              <a:t>). </a:t>
+            </a:r>
+          </a:p>
+          <a:p>
+            <a:endParaRPr lang="en-US" dirty="0"/>
+          </a:p>
+          <a:p>
+            <a:pPr marL="285750" indent="-285750"/>
+            <a:endParaRPr lang="en-US" dirty="0" smtClean="0"/>
+          </a:p>
+        </p:txBody>
+      </p:sp>
+    </p:spTree>
+    <p:extLst>
+      <p:ext uri="{BB962C8B-B14F-4D97-AF65-F5344CB8AC3E}">
+        <p14:creationId xmlns:p14="http://schemas.microsoft.com/office/powerpoint/2010/main" val="1058496176"/>
+      </p:ext>
+    </p:extLst>
+  </p:cSld>
+  <p:clrMapOvr>
+    <a:masterClrMapping/>
+  </p:clrMapOvr>
+  <p:timing>
+    <p:tnLst>
+      <p:par>
+        <p:cTn id="1" dur="indefinite" restart="never" nodeType="tmRoot"/>
+      </p:par>
+    </p:tnLst>
+  </p:timing>
+</p:sld>
+</file>
+
+<file path=ppt/slides/slide13.xml><?xml version="1.0" encoding="utf-8"?>
 <p:sld xmlns:a="http://schemas.openxmlformats.org/drawingml/2006/main" xmlns:r="http://schemas.openxmlformats.org/officeDocument/2006/relationships" xmlns:p="http://schemas.openxmlformats.org/presentationml/2006/main">
   <p:cSld>
     <p:spTree>
@@ -8836,7 +9204,7 @@
 </p:sld>
 </file>
 
-<file path=ppt/slides/slide13.xml><?xml version="1.0" encoding="utf-8"?>
+<file path=ppt/slides/slide14.xml><?xml version="1.0" encoding="utf-8"?>
 <p:sld xmlns:a="http://schemas.openxmlformats.org/drawingml/2006/main" xmlns:r="http://schemas.openxmlformats.org/officeDocument/2006/relationships" xmlns:p="http://schemas.openxmlformats.org/presentationml/2006/main">
   <p:cSld>
     <p:spTree>
@@ -9014,7 +9382,7 @@
 </p:sld>
 </file>
 
-<file path=ppt/slides/slide14.xml><?xml version="1.0" encoding="utf-8"?>
+<file path=ppt/slides/slide15.xml><?xml version="1.0" encoding="utf-8"?>
 <p:sld xmlns:a="http://schemas.openxmlformats.org/drawingml/2006/main" xmlns:r="http://schemas.openxmlformats.org/officeDocument/2006/relationships" xmlns:p="http://schemas.openxmlformats.org/presentationml/2006/main">
   <p:cSld>
     <p:spTree>
@@ -9100,7 +9468,7 @@
 </p:sld>
 </file>
 
-<file path=ppt/slides/slide15.xml><?xml version="1.0" encoding="utf-8"?>
+<file path=ppt/slides/slide16.xml><?xml version="1.0" encoding="utf-8"?>
 <p:sld xmlns:a="http://schemas.openxmlformats.org/drawingml/2006/main" xmlns:r="http://schemas.openxmlformats.org/officeDocument/2006/relationships" xmlns:p="http://schemas.openxmlformats.org/presentationml/2006/main" show="0">
   <p:cSld>
     <p:spTree>
@@ -9730,7 +10098,7 @@
 </p:sld>
 </file>
 
-<file path=ppt/slides/slide16.xml><?xml version="1.0" encoding="utf-8"?>
+<file path=ppt/slides/slide17.xml><?xml version="1.0" encoding="utf-8"?>
 <p:sld xmlns:a="http://schemas.openxmlformats.org/drawingml/2006/main" xmlns:r="http://schemas.openxmlformats.org/officeDocument/2006/relationships" xmlns:p="http://schemas.openxmlformats.org/presentationml/2006/main" show="0">
   <p:cSld>
     <p:spTree>
@@ -10226,153 +10594,6 @@
             <a:r>
               <a:rPr lang="en" sz="1600"/>
               <a:t>Excepteur sint occaecat cupidatat non proident, sunt in culpa qui officia deserunt mollit anim id est laborum.</a:t>
-            </a:r>
-          </a:p>
-        </p:txBody>
-      </p:sp>
-    </p:spTree>
-  </p:cSld>
-  <p:clrMapOvr>
-    <a:masterClrMapping/>
-  </p:clrMapOvr>
-  <mc:AlternateContent xmlns:mc="http://schemas.openxmlformats.org/markup-compatibility/2006" xmlns:p14="http://schemas.microsoft.com/office/powerpoint/2010/main">
-    <mc:Choice Requires="p14">
-      <p:transition spd="slow" p14:dur="2000"/>
-    </mc:Choice>
-    <mc:Fallback xmlns="">
-      <p:transition spd="slow"/>
-    </mc:Fallback>
-  </mc:AlternateContent>
-</p:sld>
-</file>
-
-<file path=ppt/slides/slide17.xml><?xml version="1.0" encoding="utf-8"?>
-<p:sld xmlns:a="http://schemas.openxmlformats.org/drawingml/2006/main" xmlns:r="http://schemas.openxmlformats.org/officeDocument/2006/relationships" xmlns:p="http://schemas.openxmlformats.org/presentationml/2006/main" show="0">
-  <p:cSld>
-    <p:spTree>
-      <p:nvGrpSpPr>
-        <p:cNvPr id="1" name="Shape 200"/>
-        <p:cNvGrpSpPr/>
-        <p:nvPr/>
-      </p:nvGrpSpPr>
-      <p:grpSpPr>
-        <a:xfrm>
-          <a:off x="0" y="0"/>
-          <a:ext cx="0" cy="0"/>
-          <a:chOff x="0" y="0"/>
-          <a:chExt cx="0" cy="0"/>
-        </a:xfrm>
-      </p:grpSpPr>
-      <p:sp>
-        <p:nvSpPr>
-          <p:cNvPr id="201" name="Shape 201"/>
-          <p:cNvSpPr txBox="1">
-            <a:spLocks noGrp="1"/>
-          </p:cNvSpPr>
-          <p:nvPr>
-            <p:ph type="title"/>
-          </p:nvPr>
-        </p:nvSpPr>
-        <p:spPr>
-          <a:xfrm>
-            <a:off x="265500" y="1151100"/>
-            <a:ext cx="4045200" cy="1564500"/>
-          </a:xfrm>
-          <a:prstGeom prst="rect">
-            <a:avLst/>
-          </a:prstGeom>
-        </p:spPr>
-        <p:txBody>
-          <a:bodyPr wrap="square" lIns="91425" tIns="91425" rIns="91425" bIns="91425" anchor="b" anchorCtr="0">
-            <a:noAutofit/>
-          </a:bodyPr>
-          <a:lstStyle/>
-          <a:p>
-            <a:pPr lvl="0">
-              <a:spcBef>
-                <a:spcPts val="0"/>
-              </a:spcBef>
-              <a:buNone/>
-            </a:pPr>
-            <a:r>
-              <a:rPr lang="en"/>
-              <a:t>Solution</a:t>
-            </a:r>
-          </a:p>
-        </p:txBody>
-      </p:sp>
-      <p:sp>
-        <p:nvSpPr>
-          <p:cNvPr id="202" name="Shape 202"/>
-          <p:cNvSpPr txBox="1">
-            <a:spLocks noGrp="1"/>
-          </p:cNvSpPr>
-          <p:nvPr>
-            <p:ph type="subTitle" idx="1"/>
-          </p:nvPr>
-        </p:nvSpPr>
-        <p:spPr>
-          <a:xfrm>
-            <a:off x="265500" y="2769001"/>
-            <a:ext cx="4045200" cy="1269300"/>
-          </a:xfrm>
-          <a:prstGeom prst="rect">
-            <a:avLst/>
-          </a:prstGeom>
-        </p:spPr>
-        <p:txBody>
-          <a:bodyPr wrap="square" lIns="91425" tIns="91425" rIns="91425" bIns="91425" anchor="t" anchorCtr="0">
-            <a:noAutofit/>
-          </a:bodyPr>
-          <a:lstStyle/>
-          <a:p>
-            <a:pPr lvl="0">
-              <a:spcBef>
-                <a:spcPts val="0"/>
-              </a:spcBef>
-              <a:buNone/>
-            </a:pPr>
-            <a:r>
-              <a:rPr lang="en"/>
-              <a:t>More premium subscribers</a:t>
-            </a:r>
-          </a:p>
-        </p:txBody>
-      </p:sp>
-      <p:sp>
-        <p:nvSpPr>
-          <p:cNvPr id="203" name="Shape 203"/>
-          <p:cNvSpPr txBox="1">
-            <a:spLocks noGrp="1"/>
-          </p:cNvSpPr>
-          <p:nvPr>
-            <p:ph type="body" idx="2"/>
-          </p:nvPr>
-        </p:nvSpPr>
-        <p:spPr>
-          <a:xfrm>
-            <a:off x="4939500" y="724200"/>
-            <a:ext cx="3837000" cy="3695100"/>
-          </a:xfrm>
-          <a:prstGeom prst="rect">
-            <a:avLst/>
-          </a:prstGeom>
-        </p:spPr>
-        <p:txBody>
-          <a:bodyPr wrap="square" lIns="91425" tIns="91425" rIns="91425" bIns="91425" anchor="ctr" anchorCtr="0">
-            <a:noAutofit/>
-          </a:bodyPr>
-          <a:lstStyle/>
-          <a:p>
-            <a:pPr lvl="0">
-              <a:spcBef>
-                <a:spcPts val="0"/>
-              </a:spcBef>
-              <a:buNone/>
-            </a:pPr>
-            <a:r>
-              <a:rPr lang="en"/>
-              <a:t>Lorem ipsum dolor sit amet, consectetur adipiscing elit, sed do eiusmod tempor incididunt ut labore et dolore magna aliqua.</a:t>
             </a:r>
           </a:p>
         </p:txBody>
@@ -10398,7 +10619,7 @@
   <p:cSld>
     <p:spTree>
       <p:nvGrpSpPr>
-        <p:cNvPr id="1" name="Shape 207"/>
+        <p:cNvPr id="1" name="Shape 200"/>
         <p:cNvGrpSpPr/>
         <p:nvPr/>
       </p:nvGrpSpPr>
@@ -10412,7 +10633,7 @@
       </p:grpSpPr>
       <p:sp>
         <p:nvSpPr>
-          <p:cNvPr id="208" name="Shape 208"/>
+          <p:cNvPr id="201" name="Shape 201"/>
           <p:cNvSpPr txBox="1">
             <a:spLocks noGrp="1"/>
           </p:cNvSpPr>
@@ -10422,8 +10643,84 @@
         </p:nvSpPr>
         <p:spPr>
           <a:xfrm>
-            <a:off x="598100" y="2152347"/>
-            <a:ext cx="8222100" cy="838800"/>
+            <a:off x="265500" y="1151100"/>
+            <a:ext cx="4045200" cy="1564500"/>
+          </a:xfrm>
+          <a:prstGeom prst="rect">
+            <a:avLst/>
+          </a:prstGeom>
+        </p:spPr>
+        <p:txBody>
+          <a:bodyPr wrap="square" lIns="91425" tIns="91425" rIns="91425" bIns="91425" anchor="b" anchorCtr="0">
+            <a:noAutofit/>
+          </a:bodyPr>
+          <a:lstStyle/>
+          <a:p>
+            <a:pPr lvl="0">
+              <a:spcBef>
+                <a:spcPts val="0"/>
+              </a:spcBef>
+              <a:buNone/>
+            </a:pPr>
+            <a:r>
+              <a:rPr lang="en"/>
+              <a:t>Solution</a:t>
+            </a:r>
+          </a:p>
+        </p:txBody>
+      </p:sp>
+      <p:sp>
+        <p:nvSpPr>
+          <p:cNvPr id="202" name="Shape 202"/>
+          <p:cNvSpPr txBox="1">
+            <a:spLocks noGrp="1"/>
+          </p:cNvSpPr>
+          <p:nvPr>
+            <p:ph type="subTitle" idx="1"/>
+          </p:nvPr>
+        </p:nvSpPr>
+        <p:spPr>
+          <a:xfrm>
+            <a:off x="265500" y="2769001"/>
+            <a:ext cx="4045200" cy="1269300"/>
+          </a:xfrm>
+          <a:prstGeom prst="rect">
+            <a:avLst/>
+          </a:prstGeom>
+        </p:spPr>
+        <p:txBody>
+          <a:bodyPr wrap="square" lIns="91425" tIns="91425" rIns="91425" bIns="91425" anchor="t" anchorCtr="0">
+            <a:noAutofit/>
+          </a:bodyPr>
+          <a:lstStyle/>
+          <a:p>
+            <a:pPr lvl="0">
+              <a:spcBef>
+                <a:spcPts val="0"/>
+              </a:spcBef>
+              <a:buNone/>
+            </a:pPr>
+            <a:r>
+              <a:rPr lang="en"/>
+              <a:t>More premium subscribers</a:t>
+            </a:r>
+          </a:p>
+        </p:txBody>
+      </p:sp>
+      <p:sp>
+        <p:nvSpPr>
+          <p:cNvPr id="203" name="Shape 203"/>
+          <p:cNvSpPr txBox="1">
+            <a:spLocks noGrp="1"/>
+          </p:cNvSpPr>
+          <p:nvPr>
+            <p:ph type="body" idx="2"/>
+          </p:nvPr>
+        </p:nvSpPr>
+        <p:spPr>
+          <a:xfrm>
+            <a:off x="4939500" y="724200"/>
+            <a:ext cx="3837000" cy="3695100"/>
           </a:xfrm>
           <a:prstGeom prst="rect">
             <a:avLst/>
@@ -10443,7 +10740,7 @@
             </a:pPr>
             <a:r>
               <a:rPr lang="en"/>
-              <a:t>Implementation</a:t>
+              <a:t>Lorem ipsum dolor sit amet, consectetur adipiscing elit, sed do eiusmod tempor incididunt ut labore et dolore magna aliqua.</a:t>
             </a:r>
           </a:p>
         </p:txBody>
@@ -10465,6 +10762,236 @@
 </file>
 
 <file path=ppt/slides/slide19.xml><?xml version="1.0" encoding="utf-8"?>
+<p:sld xmlns:a="http://schemas.openxmlformats.org/drawingml/2006/main" xmlns:r="http://schemas.openxmlformats.org/officeDocument/2006/relationships" xmlns:p="http://schemas.openxmlformats.org/presentationml/2006/main" show="0">
+  <p:cSld>
+    <p:spTree>
+      <p:nvGrpSpPr>
+        <p:cNvPr id="1" name="Shape 207"/>
+        <p:cNvGrpSpPr/>
+        <p:nvPr/>
+      </p:nvGrpSpPr>
+      <p:grpSpPr>
+        <a:xfrm>
+          <a:off x="0" y="0"/>
+          <a:ext cx="0" cy="0"/>
+          <a:chOff x="0" y="0"/>
+          <a:chExt cx="0" cy="0"/>
+        </a:xfrm>
+      </p:grpSpPr>
+      <p:sp>
+        <p:nvSpPr>
+          <p:cNvPr id="208" name="Shape 208"/>
+          <p:cNvSpPr txBox="1">
+            <a:spLocks noGrp="1"/>
+          </p:cNvSpPr>
+          <p:nvPr>
+            <p:ph type="title"/>
+          </p:nvPr>
+        </p:nvSpPr>
+        <p:spPr>
+          <a:xfrm>
+            <a:off x="598100" y="2152347"/>
+            <a:ext cx="8222100" cy="838800"/>
+          </a:xfrm>
+          <a:prstGeom prst="rect">
+            <a:avLst/>
+          </a:prstGeom>
+        </p:spPr>
+        <p:txBody>
+          <a:bodyPr wrap="square" lIns="91425" tIns="91425" rIns="91425" bIns="91425" anchor="ctr" anchorCtr="0">
+            <a:noAutofit/>
+          </a:bodyPr>
+          <a:lstStyle/>
+          <a:p>
+            <a:pPr lvl="0">
+              <a:spcBef>
+                <a:spcPts val="0"/>
+              </a:spcBef>
+              <a:buNone/>
+            </a:pPr>
+            <a:r>
+              <a:rPr lang="en"/>
+              <a:t>Implementation</a:t>
+            </a:r>
+          </a:p>
+        </p:txBody>
+      </p:sp>
+    </p:spTree>
+  </p:cSld>
+  <p:clrMapOvr>
+    <a:masterClrMapping/>
+  </p:clrMapOvr>
+  <mc:AlternateContent xmlns:mc="http://schemas.openxmlformats.org/markup-compatibility/2006" xmlns:p14="http://schemas.microsoft.com/office/powerpoint/2010/main">
+    <mc:Choice Requires="p14">
+      <p:transition spd="slow" p14:dur="2000"/>
+    </mc:Choice>
+    <mc:Fallback xmlns="">
+      <p:transition spd="slow"/>
+    </mc:Fallback>
+  </mc:AlternateContent>
+</p:sld>
+</file>
+
+<file path=ppt/slides/slide2.xml><?xml version="1.0" encoding="utf-8"?>
+<p:sld xmlns:a="http://schemas.openxmlformats.org/drawingml/2006/main" xmlns:r="http://schemas.openxmlformats.org/officeDocument/2006/relationships" xmlns:p="http://schemas.openxmlformats.org/presentationml/2006/main">
+  <p:cSld>
+    <p:spTree>
+      <p:nvGrpSpPr>
+        <p:cNvPr id="1" name="Shape 90"/>
+        <p:cNvGrpSpPr/>
+        <p:nvPr/>
+      </p:nvGrpSpPr>
+      <p:grpSpPr>
+        <a:xfrm>
+          <a:off x="0" y="0"/>
+          <a:ext cx="0" cy="0"/>
+          <a:chOff x="0" y="0"/>
+          <a:chExt cx="0" cy="0"/>
+        </a:xfrm>
+      </p:grpSpPr>
+      <p:sp>
+        <p:nvSpPr>
+          <p:cNvPr id="91" name="Shape 91"/>
+          <p:cNvSpPr txBox="1">
+            <a:spLocks noGrp="1"/>
+          </p:cNvSpPr>
+          <p:nvPr>
+            <p:ph type="title"/>
+          </p:nvPr>
+        </p:nvSpPr>
+        <p:spPr>
+          <a:xfrm>
+            <a:off x="311700" y="410000"/>
+            <a:ext cx="8520600" cy="607800"/>
+          </a:xfrm>
+          <a:prstGeom prst="rect">
+            <a:avLst/>
+          </a:prstGeom>
+        </p:spPr>
+        <p:txBody>
+          <a:bodyPr wrap="square" lIns="91425" tIns="91425" rIns="91425" bIns="91425" anchor="t" anchorCtr="0">
+            <a:noAutofit/>
+          </a:bodyPr>
+          <a:lstStyle/>
+          <a:p>
+            <a:pPr lvl="0">
+              <a:spcBef>
+                <a:spcPts val="0"/>
+              </a:spcBef>
+              <a:buNone/>
+            </a:pPr>
+            <a:r>
+              <a:rPr lang="en" dirty="0" smtClean="0"/>
+              <a:t>Problem Statement</a:t>
+            </a:r>
+            <a:endParaRPr lang="en" dirty="0"/>
+          </a:p>
+        </p:txBody>
+      </p:sp>
+      <p:sp>
+        <p:nvSpPr>
+          <p:cNvPr id="92" name="Shape 92"/>
+          <p:cNvSpPr txBox="1">
+            <a:spLocks noGrp="1"/>
+          </p:cNvSpPr>
+          <p:nvPr>
+            <p:ph type="body" idx="1"/>
+          </p:nvPr>
+        </p:nvSpPr>
+        <p:spPr>
+          <a:xfrm>
+            <a:off x="311700" y="1229875"/>
+            <a:ext cx="8520600" cy="3339000"/>
+          </a:xfrm>
+          <a:prstGeom prst="rect">
+            <a:avLst/>
+          </a:prstGeom>
+        </p:spPr>
+        <p:txBody>
+          <a:bodyPr wrap="square" lIns="91425" tIns="91425" rIns="91425" bIns="91425" anchor="t" anchorCtr="0">
+            <a:noAutofit/>
+          </a:bodyPr>
+          <a:lstStyle/>
+          <a:p>
+            <a:pPr>
+              <a:buNone/>
+            </a:pPr>
+            <a:r>
+              <a:rPr lang="en" dirty="0"/>
+              <a:t>Financial market analysis on the basis of financial news and social media data has drawn a lot of attention recently. </a:t>
+            </a:r>
+            <a:r>
+              <a:rPr lang="en-US" dirty="0"/>
+              <a:t>The objective of this study is to develop a market sentiment model based on news and social media data for financial markets using machine learning and see its impact on various financial market indicators like market indices, trading volumes, market volatility etc.</a:t>
+            </a:r>
+          </a:p>
+          <a:p>
+            <a:pPr lvl="0">
+              <a:spcBef>
+                <a:spcPts val="0"/>
+              </a:spcBef>
+              <a:buNone/>
+            </a:pPr>
+            <a:r>
+              <a:rPr lang="en" dirty="0" smtClean="0"/>
+              <a:t>Due </a:t>
+            </a:r>
+            <a:r>
+              <a:rPr lang="en" dirty="0"/>
+              <a:t>to the volatility of the financial market, price fluctuations based on news reports and social media sentiment are common. Traders draw upon a wide variety of publicly-available information to inform their market </a:t>
+            </a:r>
+            <a:r>
+              <a:rPr lang="en" dirty="0" smtClean="0"/>
+              <a:t/>
+            </a:r>
+            <a:br>
+              <a:rPr lang="en" dirty="0" smtClean="0"/>
+            </a:br>
+            <a:r>
+              <a:rPr lang="en" dirty="0" smtClean="0"/>
+              <a:t>decisions</a:t>
+            </a:r>
+            <a:r>
+              <a:rPr lang="en" dirty="0"/>
+              <a:t>.</a:t>
+            </a:r>
+          </a:p>
+          <a:p>
+            <a:pPr lvl="0">
+              <a:spcBef>
+                <a:spcPts val="0"/>
+              </a:spcBef>
+              <a:buNone/>
+            </a:pPr>
+            <a:endParaRPr dirty="0"/>
+          </a:p>
+          <a:p>
+            <a:pPr lvl="0">
+              <a:spcBef>
+                <a:spcPts val="0"/>
+              </a:spcBef>
+              <a:buNone/>
+            </a:pPr>
+            <a:endParaRPr dirty="0"/>
+          </a:p>
+        </p:txBody>
+      </p:sp>
+    </p:spTree>
+  </p:cSld>
+  <p:clrMapOvr>
+    <a:masterClrMapping/>
+  </p:clrMapOvr>
+  <p:timing>
+    <p:tnLst>
+      <p:par>
+        <p:cTn id="1" dur="indefinite" restart="never" nodeType="tmRoot"/>
+      </p:par>
+    </p:tnLst>
+  </p:timing>
+</p:sld>
+</file>
+
+<file path=ppt/slides/slide20.xml><?xml version="1.0" encoding="utf-8"?>
 <p:sld xmlns:a="http://schemas.openxmlformats.org/drawingml/2006/main" xmlns:r="http://schemas.openxmlformats.org/officeDocument/2006/relationships" xmlns:p="http://schemas.openxmlformats.org/presentationml/2006/main" show="0">
   <p:cSld>
     <p:spTree>
@@ -11542,151 +12069,7 @@
 </p:sld>
 </file>
 
-<file path=ppt/slides/slide2.xml><?xml version="1.0" encoding="utf-8"?>
-<p:sld xmlns:a="http://schemas.openxmlformats.org/drawingml/2006/main" xmlns:r="http://schemas.openxmlformats.org/officeDocument/2006/relationships" xmlns:p="http://schemas.openxmlformats.org/presentationml/2006/main">
-  <p:cSld>
-    <p:spTree>
-      <p:nvGrpSpPr>
-        <p:cNvPr id="1" name="Shape 90"/>
-        <p:cNvGrpSpPr/>
-        <p:nvPr/>
-      </p:nvGrpSpPr>
-      <p:grpSpPr>
-        <a:xfrm>
-          <a:off x="0" y="0"/>
-          <a:ext cx="0" cy="0"/>
-          <a:chOff x="0" y="0"/>
-          <a:chExt cx="0" cy="0"/>
-        </a:xfrm>
-      </p:grpSpPr>
-      <p:sp>
-        <p:nvSpPr>
-          <p:cNvPr id="91" name="Shape 91"/>
-          <p:cNvSpPr txBox="1">
-            <a:spLocks noGrp="1"/>
-          </p:cNvSpPr>
-          <p:nvPr>
-            <p:ph type="title"/>
-          </p:nvPr>
-        </p:nvSpPr>
-        <p:spPr>
-          <a:xfrm>
-            <a:off x="311700" y="410000"/>
-            <a:ext cx="8520600" cy="607800"/>
-          </a:xfrm>
-          <a:prstGeom prst="rect">
-            <a:avLst/>
-          </a:prstGeom>
-        </p:spPr>
-        <p:txBody>
-          <a:bodyPr wrap="square" lIns="91425" tIns="91425" rIns="91425" bIns="91425" anchor="t" anchorCtr="0">
-            <a:noAutofit/>
-          </a:bodyPr>
-          <a:lstStyle/>
-          <a:p>
-            <a:pPr lvl="0">
-              <a:spcBef>
-                <a:spcPts val="0"/>
-              </a:spcBef>
-              <a:buNone/>
-            </a:pPr>
-            <a:r>
-              <a:rPr lang="en" dirty="0" smtClean="0"/>
-              <a:t>Problem Statement</a:t>
-            </a:r>
-            <a:endParaRPr lang="en" dirty="0"/>
-          </a:p>
-        </p:txBody>
-      </p:sp>
-      <p:sp>
-        <p:nvSpPr>
-          <p:cNvPr id="92" name="Shape 92"/>
-          <p:cNvSpPr txBox="1">
-            <a:spLocks noGrp="1"/>
-          </p:cNvSpPr>
-          <p:nvPr>
-            <p:ph type="body" idx="1"/>
-          </p:nvPr>
-        </p:nvSpPr>
-        <p:spPr>
-          <a:xfrm>
-            <a:off x="311700" y="1229875"/>
-            <a:ext cx="8520600" cy="3339000"/>
-          </a:xfrm>
-          <a:prstGeom prst="rect">
-            <a:avLst/>
-          </a:prstGeom>
-        </p:spPr>
-        <p:txBody>
-          <a:bodyPr wrap="square" lIns="91425" tIns="91425" rIns="91425" bIns="91425" anchor="t" anchorCtr="0">
-            <a:noAutofit/>
-          </a:bodyPr>
-          <a:lstStyle/>
-          <a:p>
-            <a:pPr>
-              <a:buNone/>
-            </a:pPr>
-            <a:r>
-              <a:rPr lang="en" dirty="0"/>
-              <a:t>Financial market analysis on the basis of financial news and social media data has drawn a lot of attention recently. </a:t>
-            </a:r>
-            <a:r>
-              <a:rPr lang="en-US" dirty="0"/>
-              <a:t>The objective of this study is to develop a market sentiment model based on news and social media data for financial markets using machine learning and see its impact on various financial market indicators like market indices, trading volumes, market volatility etc.</a:t>
-            </a:r>
-          </a:p>
-          <a:p>
-            <a:pPr lvl="0">
-              <a:spcBef>
-                <a:spcPts val="0"/>
-              </a:spcBef>
-              <a:buNone/>
-            </a:pPr>
-            <a:r>
-              <a:rPr lang="en" dirty="0" smtClean="0"/>
-              <a:t>Due </a:t>
-            </a:r>
-            <a:r>
-              <a:rPr lang="en" dirty="0"/>
-              <a:t>to the volatility of the financial market, price fluctuations based on news reports and social media sentiment are common. Traders draw upon a wide variety of publicly-available information to inform their market decisions.</a:t>
-            </a:r>
-          </a:p>
-          <a:p>
-            <a:pPr lvl="0">
-              <a:spcBef>
-                <a:spcPts val="0"/>
-              </a:spcBef>
-              <a:buNone/>
-            </a:pPr>
-            <a:endParaRPr dirty="0"/>
-          </a:p>
-          <a:p>
-            <a:pPr lvl="0">
-              <a:spcBef>
-                <a:spcPts val="0"/>
-              </a:spcBef>
-              <a:buNone/>
-            </a:pPr>
-            <a:endParaRPr dirty="0"/>
-          </a:p>
-        </p:txBody>
-      </p:sp>
-    </p:spTree>
-  </p:cSld>
-  <p:clrMapOvr>
-    <a:masterClrMapping/>
-  </p:clrMapOvr>
-  <p:timing>
-    <p:tnLst>
-      <p:par>
-        <p:cTn id="1" dur="indefinite" restart="never" nodeType="tmRoot"/>
-      </p:par>
-    </p:tnLst>
-  </p:timing>
-</p:sld>
-</file>
-
-<file path=ppt/slides/slide20.xml><?xml version="1.0" encoding="utf-8"?>
+<file path=ppt/slides/slide21.xml><?xml version="1.0" encoding="utf-8"?>
 <p:sld xmlns:a="http://schemas.openxmlformats.org/drawingml/2006/main" xmlns:r="http://schemas.openxmlformats.org/officeDocument/2006/relationships" xmlns:p="http://schemas.openxmlformats.org/presentationml/2006/main" show="0">
   <p:cSld>
     <p:spTree>
@@ -13409,7 +13792,7 @@
 </p:sld>
 </file>
 
-<file path=ppt/slides/slide21.xml><?xml version="1.0" encoding="utf-8"?>
+<file path=ppt/slides/slide22.xml><?xml version="1.0" encoding="utf-8"?>
 <p:sld xmlns:a="http://schemas.openxmlformats.org/drawingml/2006/main" xmlns:r="http://schemas.openxmlformats.org/officeDocument/2006/relationships" xmlns:p="http://schemas.openxmlformats.org/presentationml/2006/main" show="0">
   <p:cSld>
     <p:spTree>
@@ -14888,7 +15271,7 @@
               </a:spcBef>
               <a:buNone/>
             </a:pPr>
-            <a:endParaRPr/>
+            <a:endParaRPr dirty="0"/>
           </a:p>
           <a:p>
             <a:pPr lvl="0">
@@ -14899,7 +15282,15 @@
             </a:pPr>
             <a:r>
               <a:rPr lang="en"/>
-              <a:t>The efficient market hypothesis (EMH) asserts that financial markets are "informationally efficient", or that prices on traded assets (e.g., stocks, bonds, or property) already reflect all known information, and instantly change to reflect new information.</a:t>
+              <a:t>The efficient market hypothesis (EMH) asserts that financial markets are "</a:t>
+            </a:r>
+            <a:r>
+              <a:rPr lang="en" smtClean="0"/>
+              <a:t>informational </a:t>
+            </a:r>
+            <a:r>
+              <a:rPr lang="en"/>
+              <a:t>efficient", or that prices on traded assets (e.g., stocks, bonds, or property) already reflect all known information, and instantly change to reflect new information.</a:t>
             </a:r>
           </a:p>
           <a:p>
@@ -14909,7 +15300,7 @@
               </a:spcBef>
               <a:buNone/>
             </a:pPr>
-            <a:endParaRPr/>
+            <a:endParaRPr dirty="0"/>
           </a:p>
           <a:p>
             <a:pPr lvl="0" rtl="0">
@@ -14918,7 +15309,7 @@
               </a:spcBef>
               <a:buNone/>
             </a:pPr>
-            <a:endParaRPr/>
+            <a:endParaRPr dirty="0"/>
           </a:p>
           <a:p>
             <a:pPr lvl="0" rtl="0">
@@ -14927,7 +15318,7 @@
               </a:spcBef>
               <a:buNone/>
             </a:pPr>
-            <a:endParaRPr/>
+            <a:endParaRPr dirty="0"/>
           </a:p>
         </p:txBody>
       </p:sp>

</xml_diff>

<commit_message>
Final term PPT + Report - Ready for submission
</commit_message>
<xml_diff>
--- a/presentation/Mid_Term.pptx
+++ b/presentation/Mid_Term.pptx
@@ -9111,7 +9111,7 @@
                         <a:buNone/>
                       </a:pPr>
                       <a:r>
-                        <a:rPr lang="en"/>
+                        <a:rPr lang="en" dirty="0"/>
                         <a:t>SVM</a:t>
                       </a:r>
                     </a:p>
@@ -10918,7 +10918,15 @@
             </a:pPr>
             <a:r>
               <a:rPr lang="en" dirty="0"/>
-              <a:t>Financial market analysis on the basis of financial news and social media data has drawn a lot of attention recently. </a:t>
+              <a:t>Financial market analysis on the basis of </a:t>
+            </a:r>
+            <a:r>
+              <a:rPr lang="en" dirty="0" smtClean="0"/>
+              <a:t>news </a:t>
+            </a:r>
+            <a:r>
+              <a:rPr lang="en" dirty="0"/>
+              <a:t>and social media data has drawn a lot of attention recently. </a:t>
             </a:r>
             <a:r>
               <a:rPr lang="en-US" dirty="0"/>
@@ -15281,15 +15289,15 @@
               <a:buNone/>
             </a:pPr>
             <a:r>
-              <a:rPr lang="en"/>
+              <a:rPr lang="en" dirty="0"/>
               <a:t>The efficient market hypothesis (EMH) asserts that financial markets are "</a:t>
             </a:r>
             <a:r>
-              <a:rPr lang="en" smtClean="0"/>
+              <a:rPr lang="en" dirty="0" smtClean="0"/>
               <a:t>informational </a:t>
             </a:r>
             <a:r>
-              <a:rPr lang="en"/>
+              <a:rPr lang="en" dirty="0"/>
               <a:t>efficient", or that prices on traded assets (e.g., stocks, bonds, or property) already reflect all known information, and instantly change to reflect new information.</a:t>
             </a:r>
           </a:p>
@@ -16299,7 +16307,7 @@
               <a:buNone/>
             </a:pPr>
             <a:r>
-              <a:rPr lang="en"/>
+              <a:rPr lang="en" dirty="0"/>
               <a:t>Text Preprocessing</a:t>
             </a:r>
           </a:p>

</xml_diff>